<commit_message>
Made changes in the presentation to reflect: - Updated Force Field Analysis & added colours and totals for forces for change and forces against change - Updated Work Breakdown Structure to show parallels under planning, and numbered items appropriately - Specified that the product is a mobile-first application in the Project Overview, Project Objectives and option B & C of the Business Case
</commit_message>
<xml_diff>
--- a/SY Bus Journey Planner Presentation.pptx
+++ b/SY Bus Journey Planner Presentation.pptx
@@ -1243,7 +1243,7 @@
         <a:p>
           <a:r>
             <a:rPr lang="en-US" dirty="0"/>
-            <a:t>Doesn’t address core needs (live routing, tickets, partner alignment)</a:t>
+            <a:t>Doesn’t address core needs (mobile app, live routing, tickets, partner alignment)</a:t>
           </a:r>
         </a:p>
       </dgm:t>
@@ -1357,7 +1357,7 @@
         <a:p>
           <a:r>
             <a:rPr lang="en-US" dirty="0"/>
-            <a:t>High-Fidelity Prototype + Complete management artefacts</a:t>
+            <a:t>Mobile-first application, high-Fidelity Prototype + Complete management artefacts</a:t>
           </a:r>
         </a:p>
       </dgm:t>
@@ -1599,7 +1599,7 @@
       </dsp:nvSpPr>
       <dsp:spPr>
         <a:xfrm>
-          <a:off x="4851" y="162108"/>
+          <a:off x="4851" y="81054"/>
           <a:ext cx="3069320" cy="920796"/>
         </a:xfrm>
         <a:prstGeom prst="rect">
@@ -1662,7 +1662,7 @@
         </a:p>
       </dsp:txBody>
       <dsp:txXfrm>
-        <a:off x="4851" y="162108"/>
+        <a:off x="4851" y="81054"/>
         <a:ext cx="3069320" cy="920796"/>
       </dsp:txXfrm>
     </dsp:sp>
@@ -1673,8 +1673,8 @@
       </dsp:nvSpPr>
       <dsp:spPr>
         <a:xfrm>
-          <a:off x="4851" y="1082904"/>
-          <a:ext cx="3069320" cy="1915647"/>
+          <a:off x="4851" y="1001850"/>
+          <a:ext cx="3069320" cy="2077756"/>
         </a:xfrm>
         <a:prstGeom prst="rect">
           <a:avLst/>
@@ -1795,8 +1795,8 @@
         </a:p>
       </dsp:txBody>
       <dsp:txXfrm>
-        <a:off x="4851" y="1082904"/>
-        <a:ext cx="3069320" cy="1915647"/>
+        <a:off x="4851" y="1001850"/>
+        <a:ext cx="3069320" cy="2077756"/>
       </dsp:txXfrm>
     </dsp:sp>
     <dsp:sp modelId="{FBBED180-350E-4DCA-B388-B1535C0E37D6}">
@@ -1806,7 +1806,7 @@
       </dsp:nvSpPr>
       <dsp:spPr>
         <a:xfrm>
-          <a:off x="3182066" y="162108"/>
+          <a:off x="3182066" y="81054"/>
           <a:ext cx="3069320" cy="920796"/>
         </a:xfrm>
         <a:prstGeom prst="rect">
@@ -1869,7 +1869,7 @@
         </a:p>
       </dsp:txBody>
       <dsp:txXfrm>
-        <a:off x="3182066" y="162108"/>
+        <a:off x="3182066" y="81054"/>
         <a:ext cx="3069320" cy="920796"/>
       </dsp:txXfrm>
     </dsp:sp>
@@ -1880,8 +1880,8 @@
       </dsp:nvSpPr>
       <dsp:spPr>
         <a:xfrm>
-          <a:off x="3182066" y="1082904"/>
-          <a:ext cx="3069320" cy="1915647"/>
+          <a:off x="3182066" y="1001850"/>
+          <a:ext cx="3069320" cy="2077756"/>
         </a:xfrm>
         <a:prstGeom prst="rect">
           <a:avLst/>
@@ -1979,13 +1979,13 @@
           </a:pPr>
           <a:r>
             <a:rPr lang="en-US" sz="1200" kern="1200" dirty="0"/>
-            <a:t>Doesn’t address core needs (live routing, tickets, partner alignment)</a:t>
+            <a:t>Doesn’t address core needs (mobile app, live routing, tickets, partner alignment)</a:t>
           </a:r>
         </a:p>
       </dsp:txBody>
       <dsp:txXfrm>
-        <a:off x="3182066" y="1082904"/>
-        <a:ext cx="3069320" cy="1915647"/>
+        <a:off x="3182066" y="1001850"/>
+        <a:ext cx="3069320" cy="2077756"/>
       </dsp:txXfrm>
     </dsp:sp>
     <dsp:sp modelId="{B884D7B0-B620-4844-AE71-205FED6FB08C}">
@@ -1995,7 +1995,7 @@
       </dsp:nvSpPr>
       <dsp:spPr>
         <a:xfrm>
-          <a:off x="6359281" y="162108"/>
+          <a:off x="6359281" y="81054"/>
           <a:ext cx="3069320" cy="920796"/>
         </a:xfrm>
         <a:prstGeom prst="rect">
@@ -2058,7 +2058,7 @@
         </a:p>
       </dsp:txBody>
       <dsp:txXfrm>
-        <a:off x="6359281" y="162108"/>
+        <a:off x="6359281" y="81054"/>
         <a:ext cx="3069320" cy="920796"/>
       </dsp:txXfrm>
     </dsp:sp>
@@ -2069,8 +2069,8 @@
       </dsp:nvSpPr>
       <dsp:spPr>
         <a:xfrm>
-          <a:off x="6359281" y="1082904"/>
-          <a:ext cx="3069320" cy="1915647"/>
+          <a:off x="6359281" y="1001850"/>
+          <a:ext cx="3069320" cy="2077756"/>
         </a:xfrm>
         <a:prstGeom prst="rect">
           <a:avLst/>
@@ -2150,7 +2150,7 @@
           </a:pPr>
           <a:r>
             <a:rPr lang="en-US" sz="1200" kern="1200" dirty="0"/>
-            <a:t>High-Fidelity Prototype + Complete management artefacts</a:t>
+            <a:t>Mobile-first application, high-Fidelity Prototype + Complete management artefacts</a:t>
           </a:r>
         </a:p>
         <a:p>
@@ -2191,8 +2191,8 @@
         </a:p>
       </dsp:txBody>
       <dsp:txXfrm>
-        <a:off x="6359281" y="1082904"/>
-        <a:ext cx="3069320" cy="1915647"/>
+        <a:off x="6359281" y="1001850"/>
+        <a:ext cx="3069320" cy="2077756"/>
       </dsp:txXfrm>
     </dsp:sp>
   </dsp:spTree>
@@ -12101,6 +12101,13 @@
             <a:schemeClr val="lt1"/>
           </a:fontRef>
         </p:style>
+        <p:txBody>
+          <a:bodyPr/>
+          <a:lstStyle/>
+          <a:p>
+            <a:endParaRPr lang="en-GB"/>
+          </a:p>
+        </p:txBody>
       </p:sp>
       <p:sp>
         <p:nvSpPr>
@@ -19246,7 +19253,9 @@
         </p:nvSpPr>
         <p:spPr/>
         <p:txBody>
-          <a:bodyPr/>
+          <a:bodyPr>
+            <a:normAutofit lnSpcReduction="10000"/>
+          </a:bodyPr>
           <a:lstStyle/>
           <a:p>
             <a:r>
@@ -19265,7 +19274,7 @@
             </a:r>
             <a:r>
               <a:rPr lang="en-GB" dirty="0"/>
-              <a:t> SYB Journey Planner – improve customer experience and reduce delays. </a:t>
+              <a:t> SYB Journey Planner – mobile application to improve customer experience and reduce delays. </a:t>
             </a:r>
           </a:p>
           <a:p>
@@ -19285,7 +19294,7 @@
             </a:r>
             <a:r>
               <a:rPr lang="en-GB" dirty="0"/>
-              <a:t> Deliver prototype &amp; project artefacts by Dec 2025, aligned with bus company branding.</a:t>
+              <a:t> Deliver mobile-first application, prototype &amp; project artefacts by Dec 2025, aligned with bus company branding.</a:t>
             </a:r>
           </a:p>
           <a:p>
@@ -19856,7 +19865,7 @@
             </a:r>
             <a:r>
               <a:rPr lang="en-US" sz="1600" b="1" dirty="0"/>
-              <a:t>19 | </a:t>
+              <a:t>20 | </a:t>
             </a:r>
             <a:r>
               <a:rPr lang="en-US" sz="1600" dirty="0"/>
@@ -20004,7 +20013,7 @@
       </p:sp>
       <p:pic>
         <p:nvPicPr>
-          <p:cNvPr id="1026" name="Picture 2" descr="A diagram of a company's process&#10;&#10;AI-generated content may be incorrect.">
+          <p:cNvPr id="1026" name="Picture 2">
             <a:extLst>
               <a:ext uri="{FF2B5EF4-FFF2-40B4-BE49-F238E27FC236}">
                 <a16:creationId xmlns:a16="http://schemas.microsoft.com/office/drawing/2014/main" id="{BFF2B3BF-97E3-C8A2-EF63-1452D7A5748B}"/>
@@ -20024,14 +20033,13 @@
               </a:ext>
             </a:extLst>
           </a:blip>
-          <a:stretch>
-            <a:fillRect/>
-          </a:stretch>
+          <a:srcRect/>
+          <a:stretch/>
         </p:blipFill>
         <p:spPr bwMode="auto">
           <a:xfrm>
-            <a:off x="7089208" y="955591"/>
-            <a:ext cx="4087869" cy="4940024"/>
+            <a:off x="6729987" y="1024574"/>
+            <a:ext cx="4685601" cy="4690426"/>
           </a:xfrm>
           <a:prstGeom prst="rect">
             <a:avLst/>
@@ -20558,7 +20566,7 @@
           <p:nvPr>
             <p:extLst>
               <p:ext uri="{D42A27DB-BD31-4B8C-83A1-F6EECF244321}">
-                <p14:modId xmlns:p14="http://schemas.microsoft.com/office/powerpoint/2010/main" val="646350067"/>
+                <p14:modId xmlns:p14="http://schemas.microsoft.com/office/powerpoint/2010/main" val="3375051621"/>
               </p:ext>
             </p:extLst>
           </p:nvPr>
@@ -21253,21 +21261,21 @@
           <a:chExt cx="0" cy="0"/>
         </a:xfrm>
       </p:grpSpPr>
-      <p:grpSp>
-        <p:nvGrpSpPr>
-          <p:cNvPr id="9" name="Group 8">
+      <p:sp useBgFill="1">
+        <p:nvSpPr>
+          <p:cNvPr id="20" name="Rectangle 19">
             <a:extLst>
               <a:ext uri="{FF2B5EF4-FFF2-40B4-BE49-F238E27FC236}">
-                <a16:creationId xmlns:a16="http://schemas.microsoft.com/office/drawing/2014/main" id="{E7E11A8B-D353-4867-842B-40B7BABC9EED}"/>
+                <a16:creationId xmlns:a16="http://schemas.microsoft.com/office/drawing/2014/main" id="{8DCA3673-CDE4-40C5-9FA8-F89874CFBA73}"/>
               </a:ext>
               <a:ext uri="{C183D7F6-B498-43B3-948B-1728B52AA6E4}">
                 <adec:decorative xmlns:adec="http://schemas.microsoft.com/office/drawing/2017/decorative" val="1"/>
               </a:ext>
             </a:extLst>
           </p:cNvPr>
-          <p:cNvGrpSpPr>
-            <a:grpSpLocks noGrp="1" noUngrp="1" noRot="1" noChangeAspect="1" noMove="1" noResize="1"/>
-          </p:cNvGrpSpPr>
+          <p:cNvSpPr>
+            <a:spLocks noGrp="1" noRot="1" noChangeAspect="1" noMove="1" noResize="1" noEditPoints="1" noAdjustHandles="1" noChangeArrowheads="1" noChangeShapeType="1" noTextEdit="1"/>
+          </p:cNvSpPr>
           <p:nvPr>
             <p:extLst>
               <p:ext uri="{386F3935-93C4-4BCD-93E2-E3B085C9AB24}">
@@ -21275,151 +21283,114 @@
               </p:ext>
             </p:extLst>
           </p:nvPr>
-        </p:nvGrpSpPr>
-        <p:grpSpPr>
-          <a:xfrm>
-            <a:off x="-3176" y="0"/>
-            <a:ext cx="12192000" cy="6858001"/>
-            <a:chOff x="-3176" y="0"/>
-            <a:chExt cx="12192000" cy="6858001"/>
-          </a:xfrm>
-        </p:grpSpPr>
-        <p:sp useBgFill="1">
-          <p:nvSpPr>
-            <p:cNvPr id="10" name="Rectangle 9">
-              <a:extLst>
-                <a:ext uri="{FF2B5EF4-FFF2-40B4-BE49-F238E27FC236}">
-                  <a16:creationId xmlns:a16="http://schemas.microsoft.com/office/drawing/2014/main" id="{F0C50D17-020B-418B-BE67-DC7DEA17D23F}"/>
-                </a:ext>
-                <a:ext uri="{C183D7F6-B498-43B3-948B-1728B52AA6E4}">
-                  <adec:decorative xmlns:adec="http://schemas.microsoft.com/office/drawing/2017/decorative" val="1"/>
-                </a:ext>
-              </a:extLst>
-            </p:cNvPr>
-            <p:cNvSpPr/>
-            <p:nvPr>
-              <p:extLst>
-                <p:ext uri="{386F3935-93C4-4BCD-93E2-E3B085C9AB24}">
-                  <p16:designElem xmlns:p16="http://schemas.microsoft.com/office/powerpoint/2015/main" val="1"/>
-                </p:ext>
-              </p:extLst>
-            </p:nvPr>
-          </p:nvSpPr>
-          <p:spPr>
-            <a:xfrm>
-              <a:off x="0" y="0"/>
-              <a:ext cx="12188824" cy="6858001"/>
-            </a:xfrm>
-            <a:prstGeom prst="rect">
-              <a:avLst/>
-            </a:prstGeom>
-            <a:ln>
-              <a:noFill/>
-            </a:ln>
-          </p:spPr>
-          <p:style>
-            <a:lnRef idx="2">
-              <a:schemeClr val="accent1">
-                <a:shade val="50000"/>
-              </a:schemeClr>
-            </a:lnRef>
-            <a:fillRef idx="1">
-              <a:schemeClr val="accent1"/>
-            </a:fillRef>
-            <a:effectRef idx="0">
-              <a:schemeClr val="accent1"/>
-            </a:effectRef>
-            <a:fontRef idx="minor">
-              <a:schemeClr val="lt1"/>
-            </a:fontRef>
-          </p:style>
-          <p:txBody>
-            <a:bodyPr rtlCol="0" anchor="ctr"/>
-            <a:lstStyle/>
-            <a:p>
-              <a:pPr algn="ctr"/>
-              <a:endParaRPr lang="en-US"/>
-            </a:p>
-          </p:txBody>
-        </p:sp>
-        <p:pic>
-          <p:nvPicPr>
-            <p:cNvPr id="11" name="Picture 10">
-              <a:extLst>
-                <a:ext uri="{FF2B5EF4-FFF2-40B4-BE49-F238E27FC236}">
-                  <a16:creationId xmlns:a16="http://schemas.microsoft.com/office/drawing/2014/main" id="{3E9D5520-887C-4E25-9F91-49EBA2FB3F65}"/>
-                </a:ext>
-                <a:ext uri="{C183D7F6-B498-43B3-948B-1728B52AA6E4}">
-                  <adec:decorative xmlns:adec="http://schemas.microsoft.com/office/drawing/2017/decorative" val="1"/>
-                </a:ext>
-              </a:extLst>
-            </p:cNvPr>
-            <p:cNvPicPr>
-              <a:picLocks noChangeAspect="1"/>
-            </p:cNvPicPr>
-            <p:nvPr>
-              <p:extLst>
-                <p:ext uri="{386F3935-93C4-4BCD-93E2-E3B085C9AB24}">
-                  <p16:designElem xmlns:p16="http://schemas.microsoft.com/office/powerpoint/2015/main" val="1"/>
-                </p:ext>
-              </p:extLst>
-            </p:nvPr>
-          </p:nvPicPr>
-          <p:blipFill>
-            <a:blip r:embed="rId3">
-              <a:alphaModFix amt="10000"/>
-              <a:extLst>
-                <a:ext uri="{28A0092B-C50C-407E-A947-70E740481C1C}">
-                  <a14:useLocalDpi xmlns:a14="http://schemas.microsoft.com/office/drawing/2010/main" val="0"/>
-                </a:ext>
-              </a:extLst>
-            </a:blip>
-            <a:stretch>
-              <a:fillRect/>
-            </a:stretch>
-          </p:blipFill>
-          <p:spPr>
-            <a:xfrm>
-              <a:off x="-3176" y="0"/>
-              <a:ext cx="12192000" cy="6858000"/>
-            </a:xfrm>
-            <a:prstGeom prst="rect">
-              <a:avLst/>
-            </a:prstGeom>
-          </p:spPr>
-        </p:pic>
-      </p:grpSp>
+        </p:nvSpPr>
+        <p:spPr>
+          <a:xfrm>
+            <a:off x="0" y="-1"/>
+            <a:ext cx="12188824" cy="6858001"/>
+          </a:xfrm>
+          <a:prstGeom prst="rect">
+            <a:avLst/>
+          </a:prstGeom>
+        </p:spPr>
+        <p:style>
+          <a:lnRef idx="2">
+            <a:schemeClr val="accent1">
+              <a:shade val="50000"/>
+            </a:schemeClr>
+          </a:lnRef>
+          <a:fillRef idx="1">
+            <a:schemeClr val="accent1"/>
+          </a:fillRef>
+          <a:effectRef idx="0">
+            <a:schemeClr val="accent1"/>
+          </a:effectRef>
+          <a:fontRef idx="minor">
+            <a:schemeClr val="lt1"/>
+          </a:fontRef>
+        </p:style>
+        <p:txBody>
+          <a:bodyPr rtlCol="0" anchor="ctr"/>
+          <a:lstStyle/>
+          <a:p>
+            <a:pPr algn="ctr"/>
+            <a:endParaRPr lang="en-US"/>
+          </a:p>
+        </p:txBody>
+      </p:sp>
       <p:pic>
         <p:nvPicPr>
-          <p:cNvPr id="4" name="Content Placeholder 4" descr="A screenshot of a computer&#10;&#10;AI-generated content may be incorrect.">
+          <p:cNvPr id="22" name="Picture 21">
             <a:extLst>
               <a:ext uri="{FF2B5EF4-FFF2-40B4-BE49-F238E27FC236}">
-                <a16:creationId xmlns:a16="http://schemas.microsoft.com/office/drawing/2014/main" id="{7F94ACD8-C505-6D95-CFA1-A2F649B18F1B}"/>
+                <a16:creationId xmlns:a16="http://schemas.microsoft.com/office/drawing/2014/main" id="{95756E8F-499C-4533-BBE8-309C3E8D985C}"/>
+              </a:ext>
+              <a:ext uri="{C183D7F6-B498-43B3-948B-1728B52AA6E4}">
+                <adec:decorative xmlns:adec="http://schemas.microsoft.com/office/drawing/2017/decorative" val="1"/>
               </a:ext>
             </a:extLst>
           </p:cNvPr>
           <p:cNvPicPr>
-            <a:picLocks noChangeAspect="1"/>
+            <a:picLocks noGrp="1" noRot="1" noChangeAspect="1" noMove="1" noResize="1" noEditPoints="1" noAdjustHandles="1" noChangeArrowheads="1" noChangeShapeType="1" noCrop="1"/>
           </p:cNvPicPr>
-          <p:nvPr/>
+          <p:nvPr>
+            <p:extLst>
+              <p:ext uri="{386F3935-93C4-4BCD-93E2-E3B085C9AB24}">
+                <p16:designElem xmlns:p16="http://schemas.microsoft.com/office/powerpoint/2015/main" val="1"/>
+              </p:ext>
+            </p:extLst>
+          </p:nvPr>
         </p:nvPicPr>
         <p:blipFill>
-          <a:blip r:embed="rId4">
+          <a:blip r:embed="rId3">
+            <a:alphaModFix amt="10000"/>
             <a:extLst>
               <a:ext uri="{28A0092B-C50C-407E-A947-70E740481C1C}">
                 <a14:useLocalDpi xmlns:a14="http://schemas.microsoft.com/office/drawing/2010/main" val="0"/>
               </a:ext>
             </a:extLst>
           </a:blip>
-          <a:srcRect r="2" b="5195"/>
           <a:stretch>
             <a:fillRect/>
           </a:stretch>
         </p:blipFill>
         <p:spPr>
           <a:xfrm>
-            <a:off x="6096000" y="10"/>
-            <a:ext cx="6092823" cy="6856310"/>
+            <a:off x="-3176" y="0"/>
+            <a:ext cx="12192000" cy="6858000"/>
+          </a:xfrm>
+          <a:prstGeom prst="rect">
+            <a:avLst/>
+          </a:prstGeom>
+        </p:spPr>
+      </p:pic>
+      <p:sp>
+        <p:nvSpPr>
+          <p:cNvPr id="24" name="Rectangle 23">
+            <a:extLst>
+              <a:ext uri="{FF2B5EF4-FFF2-40B4-BE49-F238E27FC236}">
+                <a16:creationId xmlns:a16="http://schemas.microsoft.com/office/drawing/2014/main" id="{0FFFD040-32A9-4D2B-86CA-599D030A4161}"/>
+              </a:ext>
+              <a:ext uri="{C183D7F6-B498-43B3-948B-1728B52AA6E4}">
+                <adec:decorative xmlns:adec="http://schemas.microsoft.com/office/drawing/2017/decorative" val="1"/>
+              </a:ext>
+            </a:extLst>
+          </p:cNvPr>
+          <p:cNvSpPr>
+            <a:spLocks noGrp="1" noRot="1" noChangeAspect="1" noMove="1" noResize="1" noEditPoints="1" noAdjustHandles="1" noChangeArrowheads="1" noChangeShapeType="1" noTextEdit="1"/>
+          </p:cNvSpPr>
+          <p:nvPr>
+            <p:extLst>
+              <p:ext uri="{386F3935-93C4-4BCD-93E2-E3B085C9AB24}">
+                <p16:designElem xmlns:p16="http://schemas.microsoft.com/office/powerpoint/2015/main" val="1"/>
+              </p:ext>
+            </p:extLst>
+          </p:nvPr>
+        </p:nvSpPr>
+        <p:spPr>
+          <a:xfrm>
+            <a:off x="4639056" y="0"/>
+            <a:ext cx="7552944" cy="6858001"/>
           </a:xfrm>
           <a:prstGeom prst="rect">
             <a:avLst/>
@@ -21427,15 +21398,38 @@
           <a:ln>
             <a:noFill/>
           </a:ln>
-          <a:effectLst/>
-        </p:spPr>
-      </p:pic>
-      <p:sp>
-        <p:nvSpPr>
-          <p:cNvPr id="13" name="Rectangle 12">
+        </p:spPr>
+        <p:style>
+          <a:lnRef idx="2">
+            <a:schemeClr val="accent1">
+              <a:shade val="50000"/>
+            </a:schemeClr>
+          </a:lnRef>
+          <a:fillRef idx="1">
+            <a:schemeClr val="accent1"/>
+          </a:fillRef>
+          <a:effectRef idx="0">
+            <a:schemeClr val="accent1"/>
+          </a:effectRef>
+          <a:fontRef idx="minor">
+            <a:schemeClr val="lt1"/>
+          </a:fontRef>
+        </p:style>
+        <p:txBody>
+          <a:bodyPr rtlCol="0" anchor="ctr"/>
+          <a:lstStyle/>
+          <a:p>
+            <a:pPr algn="ctr"/>
+            <a:endParaRPr lang="en-US"/>
+          </a:p>
+        </p:txBody>
+      </p:sp>
+      <p:sp>
+        <p:nvSpPr>
+          <p:cNvPr id="26" name="Rectangle 25">
             <a:extLst>
               <a:ext uri="{FF2B5EF4-FFF2-40B4-BE49-F238E27FC236}">
-                <a16:creationId xmlns:a16="http://schemas.microsoft.com/office/drawing/2014/main" id="{C2E52CAC-158C-4DC7-AA1C-F582FFF73C60}"/>
+                <a16:creationId xmlns:a16="http://schemas.microsoft.com/office/drawing/2014/main" id="{863205CA-B7FF-4C25-A4C8-3BBBCE19D950}"/>
               </a:ext>
               <a:ext uri="{C183D7F6-B498-43B3-948B-1728B52AA6E4}">
                 <adec:decorative xmlns:adec="http://schemas.microsoft.com/office/drawing/2017/decorative" val="1"/>
@@ -21456,7 +21450,7 @@
         <p:spPr bwMode="grayWhite">
           <a:xfrm>
             <a:off x="2" y="609600"/>
-            <a:ext cx="6499753" cy="1368198"/>
+            <a:ext cx="4959094" cy="1368198"/>
           </a:xfrm>
           <a:prstGeom prst="rect">
             <a:avLst/>
@@ -21514,7 +21508,7 @@
         <p:spPr>
           <a:xfrm>
             <a:off x="680321" y="753228"/>
-            <a:ext cx="5041629" cy="1080938"/>
+            <a:ext cx="4136123" cy="1080938"/>
           </a:xfrm>
         </p:spPr>
         <p:txBody>
@@ -21524,7 +21518,7 @@
           <a:lstStyle/>
           <a:p>
             <a:r>
-              <a:rPr lang="en-GB" sz="3100"/>
+              <a:rPr lang="en-GB" sz="2400"/>
               <a:t>Project Plan – Work Breakdown Structure (WBS)</a:t>
             </a:r>
           </a:p>
@@ -21532,10 +21526,10 @@
       </p:sp>
       <p:pic>
         <p:nvPicPr>
-          <p:cNvPr id="15" name="Picture 14">
+          <p:cNvPr id="28" name="Picture 27">
             <a:extLst>
               <a:ext uri="{FF2B5EF4-FFF2-40B4-BE49-F238E27FC236}">
-                <a16:creationId xmlns:a16="http://schemas.microsoft.com/office/drawing/2014/main" id="{83211ECD-2CC2-43D9-A32B-E8669250EF55}"/>
+                <a16:creationId xmlns:a16="http://schemas.microsoft.com/office/drawing/2014/main" id="{306E3F32-3C1A-4B6E-AF26-8A15A788560F}"/>
               </a:ext>
               <a:ext uri="{C183D7F6-B498-43B3-948B-1728B52AA6E4}">
                 <adec:decorative xmlns:adec="http://schemas.microsoft.com/office/drawing/2017/decorative" val="1"/>
@@ -21554,7 +21548,7 @@
           </p:nvPr>
         </p:nvPicPr>
         <p:blipFill>
-          <a:blip r:embed="rId5">
+          <a:blip r:embed="rId4">
             <a:extLst>
               <a:ext uri="{28A0092B-C50C-407E-A947-70E740481C1C}">
                 <a14:useLocalDpi xmlns:a14="http://schemas.microsoft.com/office/drawing/2010/main" val="0"/>
@@ -21567,8 +21561,8 @@
         </p:blipFill>
         <p:spPr>
           <a:xfrm>
-            <a:off x="2" y="1970240"/>
-            <a:ext cx="6492240" cy="261714"/>
+            <a:off x="2" y="1970241"/>
+            <a:ext cx="4956048" cy="199787"/>
           </a:xfrm>
           <a:prstGeom prst="rect">
             <a:avLst/>
@@ -21593,8 +21587,8 @@
         </p:nvSpPr>
         <p:spPr>
           <a:xfrm>
-            <a:off x="680322" y="2336873"/>
-            <a:ext cx="5041628" cy="3599316"/>
+            <a:off x="680321" y="2336873"/>
+            <a:ext cx="3656289" cy="3599316"/>
           </a:xfrm>
         </p:spPr>
         <p:txBody>
@@ -21604,7 +21598,7 @@
           <a:lstStyle/>
           <a:p>
             <a:r>
-              <a:rPr lang="en-GB" sz="1700" b="1"/>
+              <a:rPr lang="en-GB" sz="1400" b="1"/>
               <a:t>The Structure: Hierarchical Decomposition</a:t>
             </a:r>
           </a:p>
@@ -21613,21 +21607,21 @@
               <a:buNone/>
             </a:pPr>
             <a:r>
-              <a:rPr lang="en-GB" sz="1700"/>
+              <a:rPr lang="en-GB" sz="1400"/>
               <a:t>The WBS is a </a:t>
             </a:r>
             <a:r>
-              <a:rPr lang="en-GB" sz="1700" b="1"/>
+              <a:rPr lang="en-GB" sz="1400" b="1"/>
               <a:t>deliverable-oriented</a:t>
             </a:r>
             <a:r>
-              <a:rPr lang="en-GB" sz="1700"/>
+              <a:rPr lang="en-GB" sz="1400"/>
               <a:t> hierarchical decomposition of the work required to accomplish the project objectives and create the required deliverables.</a:t>
             </a:r>
           </a:p>
           <a:p>
             <a:r>
-              <a:rPr lang="en-GB" sz="1700" b="1"/>
+              <a:rPr lang="en-GB" sz="1400" b="1"/>
               <a:t>The Core Unit: Work Packages</a:t>
             </a:r>
           </a:p>
@@ -21636,18 +21630,18 @@
               <a:buNone/>
             </a:pPr>
             <a:r>
-              <a:rPr lang="en-GB" sz="1700" b="1"/>
+              <a:rPr lang="en-GB" sz="1400" b="1"/>
               <a:t>Work Packages</a:t>
             </a:r>
             <a:r>
-              <a:rPr lang="en-GB" sz="1700"/>
+              <a:rPr lang="en-GB" sz="1400"/>
               <a:t> are the fundamental level of control and effort estimation in the project.</a:t>
             </a:r>
-            <a:endParaRPr lang="en-GB" sz="1700" b="1"/>
-          </a:p>
-          <a:p>
-            <a:r>
-              <a:rPr lang="en-GB" sz="1700"/>
+            <a:endParaRPr lang="en-GB" sz="1400" b="1"/>
+          </a:p>
+          <a:p>
+            <a:r>
+              <a:rPr lang="en-GB" sz="1400"/>
               <a:t>The Workflow</a:t>
             </a:r>
           </a:p>
@@ -21656,12 +21650,58 @@
               <a:buNone/>
             </a:pPr>
             <a:r>
-              <a:rPr lang="en-GB" sz="1700"/>
+              <a:rPr lang="en-GB" sz="1400"/>
               <a:t>The WBS logically follows the project lifecycle</a:t>
             </a:r>
           </a:p>
         </p:txBody>
       </p:sp>
+      <p:pic>
+        <p:nvPicPr>
+          <p:cNvPr id="6" name="Picture 5" descr="A computer screen shot of a computer screen&#10;&#10;AI-generated content may be incorrect.">
+            <a:extLst>
+              <a:ext uri="{FF2B5EF4-FFF2-40B4-BE49-F238E27FC236}">
+                <a16:creationId xmlns:a16="http://schemas.microsoft.com/office/drawing/2014/main" id="{85017A76-3D37-05E1-8869-EB9EC4C6C73B}"/>
+              </a:ext>
+            </a:extLst>
+          </p:cNvPr>
+          <p:cNvPicPr>
+            <a:picLocks noChangeAspect="1"/>
+          </p:cNvPicPr>
+          <p:nvPr/>
+        </p:nvPicPr>
+        <p:blipFill>
+          <a:blip r:embed="rId5">
+            <a:extLst>
+              <a:ext uri="{28A0092B-C50C-407E-A947-70E740481C1C}">
+                <a14:useLocalDpi xmlns:a14="http://schemas.microsoft.com/office/drawing/2010/main" val="0"/>
+              </a:ext>
+            </a:extLst>
+          </a:blip>
+          <a:stretch>
+            <a:fillRect/>
+          </a:stretch>
+        </p:blipFill>
+        <p:spPr>
+          <a:xfrm>
+            <a:off x="4639056" y="609599"/>
+            <a:ext cx="7528064" cy="5457846"/>
+          </a:xfrm>
+          <a:prstGeom prst="rect">
+            <a:avLst/>
+          </a:prstGeom>
+          <a:ln>
+            <a:noFill/>
+          </a:ln>
+          <a:effectLst>
+            <a:outerShdw blurRad="76200" dist="63500" dir="5040000" algn="tl" rotWithShape="0">
+              <a:srgbClr val="000000">
+                <a:alpha val="41000"/>
+              </a:srgbClr>
+            </a:outerShdw>
+          </a:effectLst>
+        </p:spPr>
+      </p:pic>
     </p:spTree>
     <p:extLst>
       <p:ext uri="{BB962C8B-B14F-4D97-AF65-F5344CB8AC3E}">

</xml_diff>

<commit_message>
Added 'Low Fidelity' Slide
</commit_message>
<xml_diff>
--- a/SY Bus Journey Planner Presentation.pptx
+++ b/SY Bus Journey Planner Presentation.pptx
@@ -5,16 +5,16 @@
     <p:sldMasterId id="2147483737" r:id="rId1"/>
   </p:sldMasterIdLst>
   <p:notesMasterIdLst>
-    <p:notesMasterId r:id="rId20"/>
+    <p:notesMasterId r:id="rId21"/>
   </p:notesMasterIdLst>
   <p:sldIdLst>
     <p:sldId id="256" r:id="rId2"/>
     <p:sldId id="257" r:id="rId3"/>
     <p:sldId id="258" r:id="rId4"/>
     <p:sldId id="271" r:id="rId5"/>
-    <p:sldId id="268" r:id="rId6"/>
+    <p:sldId id="277" r:id="rId6"/>
     <p:sldId id="269" r:id="rId7"/>
-    <p:sldId id="270" r:id="rId8"/>
+    <p:sldId id="278" r:id="rId8"/>
     <p:sldId id="260" r:id="rId9"/>
     <p:sldId id="272" r:id="rId10"/>
     <p:sldId id="273" r:id="rId11"/>
@@ -24,8 +24,9 @@
     <p:sldId id="267" r:id="rId15"/>
     <p:sldId id="275" r:id="rId16"/>
     <p:sldId id="264" r:id="rId17"/>
-    <p:sldId id="263" r:id="rId18"/>
-    <p:sldId id="276" r:id="rId19"/>
+    <p:sldId id="280" r:id="rId18"/>
+    <p:sldId id="263" r:id="rId19"/>
+    <p:sldId id="281" r:id="rId20"/>
   </p:sldIdLst>
   <p:sldSz cx="12192000" cy="6858000"/>
   <p:notesSz cx="6858000" cy="9144000"/>
@@ -1171,8 +1172,13 @@
         <a:p>
           <a:r>
             <a:rPr lang="en-US" b="1" dirty="0"/>
-            <a:t>Minimal change </a:t>
+            <a:t>Minimal Change – Web </a:t>
           </a:r>
+          <a:r>
+            <a:rPr lang="en-US" b="1"/>
+            <a:t>timetable Website</a:t>
+          </a:r>
+          <a:endParaRPr lang="en-US" b="1" dirty="0"/>
         </a:p>
       </dgm:t>
     </dgm:pt>
@@ -1243,7 +1249,7 @@
         <a:p>
           <a:r>
             <a:rPr lang="en-US" dirty="0"/>
-            <a:t>Doesn’t address core needs (mobile app, live routing, tickets, partner alignment)</a:t>
+            <a:t>Convert current bus timetables into a basic responsive website (no live routing or tickets)</a:t>
           </a:r>
         </a:p>
       </dgm:t>
@@ -1321,7 +1327,7 @@
         <a:p>
           <a:r>
             <a:rPr lang="en-US" b="1" dirty="0"/>
-            <a:t>Envisioned solution </a:t>
+            <a:t>Envisioned Solution – Journey Planner App</a:t>
           </a:r>
         </a:p>
       </dgm:t>
@@ -1428,7 +1434,7 @@
         <a:lstStyle/>
         <a:p>
           <a:r>
-            <a:rPr lang="en-US"/>
+            <a:rPr lang="en-US" dirty="0"/>
             <a:t>MVP approach: real value at lower risk</a:t>
           </a:r>
         </a:p>
@@ -1599,7 +1605,7 @@
       </dsp:nvSpPr>
       <dsp:spPr>
         <a:xfrm>
-          <a:off x="4851" y="81054"/>
+          <a:off x="4851" y="184401"/>
           <a:ext cx="3069320" cy="920796"/>
         </a:xfrm>
         <a:prstGeom prst="rect">
@@ -1662,7 +1668,7 @@
         </a:p>
       </dsp:txBody>
       <dsp:txXfrm>
-        <a:off x="4851" y="81054"/>
+        <a:off x="4851" y="184401"/>
         <a:ext cx="3069320" cy="920796"/>
       </dsp:txXfrm>
     </dsp:sp>
@@ -1673,8 +1679,8 @@
       </dsp:nvSpPr>
       <dsp:spPr>
         <a:xfrm>
-          <a:off x="4851" y="1001850"/>
-          <a:ext cx="3069320" cy="2077756"/>
+          <a:off x="4851" y="1105197"/>
+          <a:ext cx="3069320" cy="1871062"/>
         </a:xfrm>
         <a:prstGeom prst="rect">
           <a:avLst/>
@@ -1722,7 +1728,7 @@
         </a:bodyPr>
         <a:lstStyle/>
         <a:p>
-          <a:pPr marL="0" lvl="0" indent="0" algn="l" defTabSz="711200">
+          <a:pPr marL="0" lvl="0" indent="0" algn="l" defTabSz="577850">
             <a:lnSpc>
               <a:spcPct val="90000"/>
             </a:lnSpc>
@@ -1735,12 +1741,12 @@
             <a:buNone/>
           </a:pPr>
           <a:r>
-            <a:rPr lang="en-US" sz="1600" b="1" kern="1200" dirty="0"/>
+            <a:rPr lang="en-US" sz="1300" b="1" kern="1200" dirty="0"/>
             <a:t>Do nothing</a:t>
           </a:r>
         </a:p>
         <a:p>
-          <a:pPr marL="114300" lvl="1" indent="-114300" algn="l" defTabSz="533400">
+          <a:pPr marL="57150" lvl="1" indent="-57150" algn="l" defTabSz="444500">
             <a:lnSpc>
               <a:spcPct val="90000"/>
             </a:lnSpc>
@@ -1753,12 +1759,12 @@
             <a:buChar char="•"/>
           </a:pPr>
           <a:r>
-            <a:rPr lang="en-US" sz="1200" kern="1200" dirty="0"/>
+            <a:rPr lang="en-US" sz="1000" kern="1200" dirty="0"/>
             <a:t>No upfront cost</a:t>
           </a:r>
         </a:p>
         <a:p>
-          <a:pPr marL="114300" lvl="1" indent="-114300" algn="l" defTabSz="533400">
+          <a:pPr marL="57150" lvl="1" indent="-57150" algn="l" defTabSz="444500">
             <a:lnSpc>
               <a:spcPct val="90000"/>
             </a:lnSpc>
@@ -1771,12 +1777,12 @@
             <a:buChar char="•"/>
           </a:pPr>
           <a:r>
-            <a:rPr lang="en-US" sz="1200" kern="1200"/>
+            <a:rPr lang="en-US" sz="1000" kern="1200"/>
             <a:t>No improvement to customer experience/accessibility</a:t>
           </a:r>
         </a:p>
         <a:p>
-          <a:pPr marL="114300" lvl="1" indent="-114300" algn="l" defTabSz="533400">
+          <a:pPr marL="57150" lvl="1" indent="-57150" algn="l" defTabSz="444500">
             <a:lnSpc>
               <a:spcPct val="90000"/>
             </a:lnSpc>
@@ -1789,14 +1795,14 @@
             <a:buChar char="•"/>
           </a:pPr>
           <a:r>
-            <a:rPr lang="en-US" sz="1200" kern="1200"/>
+            <a:rPr lang="en-US" sz="1000" kern="1200"/>
             <a:t>Fails to address barriers identified</a:t>
           </a:r>
         </a:p>
       </dsp:txBody>
       <dsp:txXfrm>
-        <a:off x="4851" y="1001850"/>
-        <a:ext cx="3069320" cy="2077756"/>
+        <a:off x="4851" y="1105197"/>
+        <a:ext cx="3069320" cy="1871062"/>
       </dsp:txXfrm>
     </dsp:sp>
     <dsp:sp modelId="{FBBED180-350E-4DCA-B388-B1535C0E37D6}">
@@ -1806,7 +1812,7 @@
       </dsp:nvSpPr>
       <dsp:spPr>
         <a:xfrm>
-          <a:off x="3182066" y="81054"/>
+          <a:off x="3182066" y="184401"/>
           <a:ext cx="3069320" cy="920796"/>
         </a:xfrm>
         <a:prstGeom prst="rect">
@@ -1869,7 +1875,7 @@
         </a:p>
       </dsp:txBody>
       <dsp:txXfrm>
-        <a:off x="3182066" y="81054"/>
+        <a:off x="3182066" y="184401"/>
         <a:ext cx="3069320" cy="920796"/>
       </dsp:txXfrm>
     </dsp:sp>
@@ -1880,8 +1886,8 @@
       </dsp:nvSpPr>
       <dsp:spPr>
         <a:xfrm>
-          <a:off x="3182066" y="1001850"/>
-          <a:ext cx="3069320" cy="2077756"/>
+          <a:off x="3182066" y="1105197"/>
+          <a:ext cx="3069320" cy="1871062"/>
         </a:xfrm>
         <a:prstGeom prst="rect">
           <a:avLst/>
@@ -1929,7 +1935,7 @@
         </a:bodyPr>
         <a:lstStyle/>
         <a:p>
-          <a:pPr marL="0" lvl="0" indent="0" algn="l" defTabSz="711200">
+          <a:pPr marL="0" lvl="0" indent="0" algn="l" defTabSz="577850">
             <a:lnSpc>
               <a:spcPct val="90000"/>
             </a:lnSpc>
@@ -1942,12 +1948,17 @@
             <a:buNone/>
           </a:pPr>
           <a:r>
-            <a:rPr lang="en-US" sz="1600" b="1" kern="1200" dirty="0"/>
-            <a:t>Minimal change </a:t>
+            <a:rPr lang="en-US" sz="1300" b="1" kern="1200" dirty="0"/>
+            <a:t>Minimal Change – Web </a:t>
           </a:r>
+          <a:r>
+            <a:rPr lang="en-US" sz="1300" b="1" kern="1200"/>
+            <a:t>timetable Website</a:t>
+          </a:r>
+          <a:endParaRPr lang="en-US" sz="1300" b="1" kern="1200" dirty="0"/>
         </a:p>
         <a:p>
-          <a:pPr marL="114300" lvl="1" indent="-114300" algn="l" defTabSz="533400">
+          <a:pPr marL="57150" lvl="1" indent="-57150" algn="l" defTabSz="444500">
             <a:lnSpc>
               <a:spcPct val="90000"/>
             </a:lnSpc>
@@ -1960,12 +1971,12 @@
             <a:buChar char="•"/>
           </a:pPr>
           <a:r>
-            <a:rPr lang="en-US" sz="1200" kern="1200" dirty="0"/>
+            <a:rPr lang="en-US" sz="1000" kern="1200" dirty="0"/>
             <a:t>Low cost, Low effort (Small UI updates)</a:t>
           </a:r>
         </a:p>
         <a:p>
-          <a:pPr marL="114300" lvl="1" indent="-114300" algn="l" defTabSz="533400">
+          <a:pPr marL="57150" lvl="1" indent="-57150" algn="l" defTabSz="444500">
             <a:lnSpc>
               <a:spcPct val="90000"/>
             </a:lnSpc>
@@ -1978,14 +1989,14 @@
             <a:buChar char="•"/>
           </a:pPr>
           <a:r>
-            <a:rPr lang="en-US" sz="1200" kern="1200" dirty="0"/>
-            <a:t>Doesn’t address core needs (mobile app, live routing, tickets, partner alignment)</a:t>
+            <a:rPr lang="en-US" sz="1000" kern="1200" dirty="0"/>
+            <a:t>Convert current bus timetables into a basic responsive website (no live routing or tickets)</a:t>
           </a:r>
         </a:p>
       </dsp:txBody>
       <dsp:txXfrm>
-        <a:off x="3182066" y="1001850"/>
-        <a:ext cx="3069320" cy="2077756"/>
+        <a:off x="3182066" y="1105197"/>
+        <a:ext cx="3069320" cy="1871062"/>
       </dsp:txXfrm>
     </dsp:sp>
     <dsp:sp modelId="{B884D7B0-B620-4844-AE71-205FED6FB08C}">
@@ -1995,7 +2006,7 @@
       </dsp:nvSpPr>
       <dsp:spPr>
         <a:xfrm>
-          <a:off x="6359281" y="81054"/>
+          <a:off x="6359281" y="184401"/>
           <a:ext cx="3069320" cy="920796"/>
         </a:xfrm>
         <a:prstGeom prst="rect">
@@ -2058,7 +2069,7 @@
         </a:p>
       </dsp:txBody>
       <dsp:txXfrm>
-        <a:off x="6359281" y="81054"/>
+        <a:off x="6359281" y="184401"/>
         <a:ext cx="3069320" cy="920796"/>
       </dsp:txXfrm>
     </dsp:sp>
@@ -2069,8 +2080,8 @@
       </dsp:nvSpPr>
       <dsp:spPr>
         <a:xfrm>
-          <a:off x="6359281" y="1001850"/>
-          <a:ext cx="3069320" cy="2077756"/>
+          <a:off x="6359281" y="1105197"/>
+          <a:ext cx="3069320" cy="1871062"/>
         </a:xfrm>
         <a:prstGeom prst="rect">
           <a:avLst/>
@@ -2118,7 +2129,7 @@
         </a:bodyPr>
         <a:lstStyle/>
         <a:p>
-          <a:pPr marL="0" lvl="0" indent="0" algn="l" defTabSz="711200">
+          <a:pPr marL="0" lvl="0" indent="0" algn="l" defTabSz="577850">
             <a:lnSpc>
               <a:spcPct val="90000"/>
             </a:lnSpc>
@@ -2131,12 +2142,12 @@
             <a:buNone/>
           </a:pPr>
           <a:r>
-            <a:rPr lang="en-US" sz="1600" b="1" kern="1200" dirty="0"/>
-            <a:t>Envisioned solution </a:t>
+            <a:rPr lang="en-US" sz="1300" b="1" kern="1200" dirty="0"/>
+            <a:t>Envisioned Solution – Journey Planner App</a:t>
           </a:r>
         </a:p>
         <a:p>
-          <a:pPr marL="114300" lvl="1" indent="-114300" algn="l" defTabSz="533400">
+          <a:pPr marL="57150" lvl="1" indent="-57150" algn="l" defTabSz="444500">
             <a:lnSpc>
               <a:spcPct val="90000"/>
             </a:lnSpc>
@@ -2149,12 +2160,12 @@
             <a:buChar char="•"/>
           </a:pPr>
           <a:r>
-            <a:rPr lang="en-US" sz="1200" kern="1200" dirty="0"/>
+            <a:rPr lang="en-US" sz="1000" kern="1200" dirty="0"/>
             <a:t>Mobile-first application, high-Fidelity Prototype + Complete management artefacts</a:t>
           </a:r>
         </a:p>
         <a:p>
-          <a:pPr marL="114300" lvl="1" indent="-114300" algn="l" defTabSz="533400">
+          <a:pPr marL="57150" lvl="1" indent="-57150" algn="l" defTabSz="444500">
             <a:lnSpc>
               <a:spcPct val="90000"/>
             </a:lnSpc>
@@ -2167,12 +2178,12 @@
             <a:buChar char="•"/>
           </a:pPr>
           <a:r>
-            <a:rPr lang="en-US" sz="1200" kern="1200"/>
+            <a:rPr lang="en-US" sz="1000" kern="1200"/>
             <a:t>Demonstrates feasibility with concrete evidence</a:t>
           </a:r>
         </a:p>
         <a:p>
-          <a:pPr marL="114300" lvl="1" indent="-114300" algn="l" defTabSz="533400">
+          <a:pPr marL="57150" lvl="1" indent="-57150" algn="l" defTabSz="444500">
             <a:lnSpc>
               <a:spcPct val="90000"/>
             </a:lnSpc>
@@ -2185,14 +2196,14 @@
             <a:buChar char="•"/>
           </a:pPr>
           <a:r>
-            <a:rPr lang="en-US" sz="1200" kern="1200"/>
+            <a:rPr lang="en-US" sz="1000" kern="1200" dirty="0"/>
             <a:t>MVP approach: real value at lower risk</a:t>
           </a:r>
         </a:p>
       </dsp:txBody>
       <dsp:txXfrm>
-        <a:off x="6359281" y="1001850"/>
-        <a:ext cx="3069320" cy="2077756"/>
+        <a:off x="6359281" y="1105197"/>
+        <a:ext cx="3069320" cy="1871062"/>
       </dsp:txXfrm>
     </dsp:sp>
   </dsp:spTree>
@@ -4752,7 +4763,7 @@
           <a:p>
             <a:r>
               <a:rPr lang="en-GB" dirty="0"/>
-              <a:t>Our preferred option, which is what our project delivers, is the ‘Envisioned Solution’ featuring a High-Fidelity prototype and complete management artefacts. This option demonstrates feasibility and provides the client with concrete evidence. In Prince2 Agile terms, this is the right balance as we deliver real value at lower risk than committing fully to a product upfront, as well as remaining open to any feedback.</a:t>
+              <a:t>Our preferred option, which is what our project delivers, is the ‘Envisioned Solution – Journey Planner App’ featuring a Mobile-first Journey Planner application, High-Fidelity prototype and complete management artefacts. This option demonstrates feasibility and provides the client with concrete evidence. In Prince2 Agile terms, this is the right balance as we deliver real value at lower risk than committing fully to a product upfront, as well as remaining open to any feedback.</a:t>
             </a:r>
           </a:p>
           <a:p>
@@ -18168,6 +18179,1088 @@
 <file path=ppt/slides/slide17.xml><?xml version="1.0" encoding="utf-8"?>
 <p:sld xmlns:a="http://schemas.openxmlformats.org/drawingml/2006/main" xmlns:r="http://schemas.openxmlformats.org/officeDocument/2006/relationships" xmlns:p="http://schemas.openxmlformats.org/presentationml/2006/main">
   <p:cSld>
+    <p:bg>
+      <p:bgPr>
+        <a:gradFill rotWithShape="1">
+          <a:gsLst>
+            <a:gs pos="0">
+              <a:schemeClr val="bg2">
+                <a:tint val="96000"/>
+                <a:shade val="100000"/>
+                <a:hueMod val="92000"/>
+                <a:satMod val="200000"/>
+                <a:lumMod val="128000"/>
+              </a:schemeClr>
+            </a:gs>
+            <a:gs pos="50000">
+              <a:schemeClr val="bg2">
+                <a:shade val="100000"/>
+                <a:hueMod val="100000"/>
+                <a:satMod val="110000"/>
+                <a:lumMod val="130000"/>
+              </a:schemeClr>
+            </a:gs>
+            <a:gs pos="100000">
+              <a:schemeClr val="bg2">
+                <a:shade val="78000"/>
+                <a:hueMod val="118000"/>
+                <a:satMod val="120000"/>
+                <a:lumMod val="69000"/>
+              </a:schemeClr>
+            </a:gs>
+          </a:gsLst>
+          <a:lin ang="2520000" scaled="0"/>
+        </a:gradFill>
+        <a:effectLst/>
+      </p:bgPr>
+    </p:bg>
+    <p:spTree>
+      <p:nvGrpSpPr>
+        <p:cNvPr id="1" name="">
+          <a:extLst>
+            <a:ext uri="{FF2B5EF4-FFF2-40B4-BE49-F238E27FC236}">
+              <a16:creationId xmlns:a16="http://schemas.microsoft.com/office/drawing/2014/main" id="{D1FEC1C3-796C-1A43-27B0-51CAF390B9CC}"/>
+            </a:ext>
+          </a:extLst>
+        </p:cNvPr>
+        <p:cNvGrpSpPr/>
+        <p:nvPr/>
+      </p:nvGrpSpPr>
+      <p:grpSpPr>
+        <a:xfrm>
+          <a:off x="0" y="0"/>
+          <a:ext cx="0" cy="0"/>
+          <a:chOff x="0" y="0"/>
+          <a:chExt cx="0" cy="0"/>
+        </a:xfrm>
+      </p:grpSpPr>
+      <p:pic>
+        <p:nvPicPr>
+          <p:cNvPr id="46" name="Picture 45">
+            <a:extLst>
+              <a:ext uri="{FF2B5EF4-FFF2-40B4-BE49-F238E27FC236}">
+                <a16:creationId xmlns:a16="http://schemas.microsoft.com/office/drawing/2014/main" id="{AF1E9919-2E6F-4F78-943F-B3DAF059A0C6}"/>
+              </a:ext>
+              <a:ext uri="{C183D7F6-B498-43B3-948B-1728B52AA6E4}">
+                <adec:decorative xmlns:adec="http://schemas.microsoft.com/office/drawing/2017/decorative" val="1"/>
+              </a:ext>
+            </a:extLst>
+          </p:cNvPr>
+          <p:cNvPicPr>
+            <a:picLocks noGrp="1" noRot="1" noChangeAspect="1" noMove="1" noResize="1" noEditPoints="1" noAdjustHandles="1" noChangeArrowheads="1" noChangeShapeType="1" noCrop="1"/>
+          </p:cNvPicPr>
+          <p:nvPr>
+            <p:extLst>
+              <p:ext uri="{386F3935-93C4-4BCD-93E2-E3B085C9AB24}">
+                <p16:designElem xmlns:p16="http://schemas.microsoft.com/office/powerpoint/2015/main" val="1"/>
+              </p:ext>
+            </p:extLst>
+          </p:nvPr>
+        </p:nvPicPr>
+        <p:blipFill>
+          <a:blip r:embed="rId2">
+            <a:alphaModFix amt="10000"/>
+            <a:extLst>
+              <a:ext uri="{28A0092B-C50C-407E-A947-70E740481C1C}">
+                <a14:useLocalDpi xmlns:a14="http://schemas.microsoft.com/office/drawing/2010/main" val="0"/>
+              </a:ext>
+            </a:extLst>
+          </a:blip>
+          <a:stretch>
+            <a:fillRect/>
+          </a:stretch>
+        </p:blipFill>
+        <p:spPr>
+          <a:xfrm>
+            <a:off x="0" y="0"/>
+            <a:ext cx="12192000" cy="6858000"/>
+          </a:xfrm>
+          <a:prstGeom prst="rect">
+            <a:avLst/>
+          </a:prstGeom>
+        </p:spPr>
+      </p:pic>
+      <p:pic>
+        <p:nvPicPr>
+          <p:cNvPr id="48" name="Picture 47">
+            <a:extLst>
+              <a:ext uri="{FF2B5EF4-FFF2-40B4-BE49-F238E27FC236}">
+                <a16:creationId xmlns:a16="http://schemas.microsoft.com/office/drawing/2014/main" id="{DB854A32-A2FC-4AC1-B345-57798A0AEAB4}"/>
+              </a:ext>
+              <a:ext uri="{C183D7F6-B498-43B3-948B-1728B52AA6E4}">
+                <adec:decorative xmlns:adec="http://schemas.microsoft.com/office/drawing/2017/decorative" val="1"/>
+              </a:ext>
+            </a:extLst>
+          </p:cNvPr>
+          <p:cNvPicPr>
+            <a:picLocks noGrp="1" noRot="1" noChangeAspect="1" noMove="1" noResize="1" noEditPoints="1" noAdjustHandles="1" noChangeArrowheads="1" noChangeShapeType="1" noCrop="1"/>
+          </p:cNvPicPr>
+          <p:nvPr>
+            <p:extLst>
+              <p:ext uri="{386F3935-93C4-4BCD-93E2-E3B085C9AB24}">
+                <p16:designElem xmlns:p16="http://schemas.microsoft.com/office/powerpoint/2015/main" val="1"/>
+              </p:ext>
+            </p:extLst>
+          </p:nvPr>
+        </p:nvPicPr>
+        <p:blipFill>
+          <a:blip r:embed="rId3">
+            <a:extLst>
+              <a:ext uri="{28A0092B-C50C-407E-A947-70E740481C1C}">
+                <a14:useLocalDpi xmlns:a14="http://schemas.microsoft.com/office/drawing/2010/main" val="0"/>
+              </a:ext>
+            </a:extLst>
+          </a:blip>
+          <a:stretch>
+            <a:fillRect/>
+          </a:stretch>
+        </p:blipFill>
+        <p:spPr>
+          <a:xfrm>
+            <a:off x="1" y="4242851"/>
+            <a:ext cx="8968084" cy="275942"/>
+          </a:xfrm>
+          <a:prstGeom prst="rect">
+            <a:avLst/>
+          </a:prstGeom>
+        </p:spPr>
+      </p:pic>
+      <p:pic>
+        <p:nvPicPr>
+          <p:cNvPr id="50" name="Picture 49">
+            <a:extLst>
+              <a:ext uri="{FF2B5EF4-FFF2-40B4-BE49-F238E27FC236}">
+                <a16:creationId xmlns:a16="http://schemas.microsoft.com/office/drawing/2014/main" id="{1B08F811-177E-4A27-B4FD-BBDB99BEE22A}"/>
+              </a:ext>
+              <a:ext uri="{C183D7F6-B498-43B3-948B-1728B52AA6E4}">
+                <adec:decorative xmlns:adec="http://schemas.microsoft.com/office/drawing/2017/decorative" val="1"/>
+              </a:ext>
+            </a:extLst>
+          </p:cNvPr>
+          <p:cNvPicPr>
+            <a:picLocks noGrp="1" noRot="1" noChangeAspect="1" noMove="1" noResize="1" noEditPoints="1" noAdjustHandles="1" noChangeArrowheads="1" noChangeShapeType="1" noCrop="1"/>
+          </p:cNvPicPr>
+          <p:nvPr>
+            <p:extLst>
+              <p:ext uri="{386F3935-93C4-4BCD-93E2-E3B085C9AB24}">
+                <p16:designElem xmlns:p16="http://schemas.microsoft.com/office/powerpoint/2015/main" val="1"/>
+              </p:ext>
+            </p:extLst>
+          </p:nvPr>
+        </p:nvPicPr>
+        <p:blipFill>
+          <a:blip r:embed="rId4">
+            <a:extLst>
+              <a:ext uri="{28A0092B-C50C-407E-A947-70E740481C1C}">
+                <a14:useLocalDpi xmlns:a14="http://schemas.microsoft.com/office/drawing/2010/main" val="0"/>
+              </a:ext>
+            </a:extLst>
+          </a:blip>
+          <a:stretch>
+            <a:fillRect/>
+          </a:stretch>
+        </p:blipFill>
+        <p:spPr>
+          <a:xfrm>
+            <a:off x="9111716" y="4243845"/>
+            <a:ext cx="3077108" cy="276940"/>
+          </a:xfrm>
+          <a:prstGeom prst="rect">
+            <a:avLst/>
+          </a:prstGeom>
+        </p:spPr>
+      </p:pic>
+      <p:sp>
+        <p:nvSpPr>
+          <p:cNvPr id="52" name="Rectangle 51">
+            <a:extLst>
+              <a:ext uri="{FF2B5EF4-FFF2-40B4-BE49-F238E27FC236}">
+                <a16:creationId xmlns:a16="http://schemas.microsoft.com/office/drawing/2014/main" id="{7AF498A6-A632-436A-9DA0-1933AA8B8CE2}"/>
+              </a:ext>
+              <a:ext uri="{C183D7F6-B498-43B3-948B-1728B52AA6E4}">
+                <adec:decorative xmlns:adec="http://schemas.microsoft.com/office/drawing/2017/decorative" val="1"/>
+              </a:ext>
+            </a:extLst>
+          </p:cNvPr>
+          <p:cNvSpPr>
+            <a:spLocks noGrp="1" noRot="1" noChangeAspect="1" noMove="1" noResize="1" noEditPoints="1" noAdjustHandles="1" noChangeArrowheads="1" noChangeShapeType="1" noTextEdit="1"/>
+          </p:cNvSpPr>
+          <p:nvPr>
+            <p:extLst>
+              <p:ext uri="{386F3935-93C4-4BCD-93E2-E3B085C9AB24}">
+                <p16:designElem xmlns:p16="http://schemas.microsoft.com/office/powerpoint/2015/main" val="1"/>
+              </p:ext>
+            </p:extLst>
+          </p:nvPr>
+        </p:nvSpPr>
+        <p:spPr bwMode="ltGray">
+          <a:xfrm>
+            <a:off x="0" y="2590078"/>
+            <a:ext cx="8968085" cy="1660332"/>
+          </a:xfrm>
+          <a:prstGeom prst="rect">
+            <a:avLst/>
+          </a:prstGeom>
+          <a:solidFill>
+            <a:schemeClr val="bg1">
+              <a:lumMod val="85000"/>
+              <a:lumOff val="15000"/>
+            </a:schemeClr>
+          </a:solidFill>
+          <a:ln>
+            <a:noFill/>
+          </a:ln>
+        </p:spPr>
+        <p:style>
+          <a:lnRef idx="2">
+            <a:schemeClr val="accent1">
+              <a:shade val="50000"/>
+            </a:schemeClr>
+          </a:lnRef>
+          <a:fillRef idx="1">
+            <a:schemeClr val="accent1"/>
+          </a:fillRef>
+          <a:effectRef idx="0">
+            <a:schemeClr val="accent1"/>
+          </a:effectRef>
+          <a:fontRef idx="minor">
+            <a:schemeClr val="lt1"/>
+          </a:fontRef>
+        </p:style>
+        <p:txBody>
+          <a:bodyPr/>
+          <a:lstStyle/>
+          <a:p>
+            <a:endParaRPr lang="en-GB"/>
+          </a:p>
+        </p:txBody>
+      </p:sp>
+      <p:sp>
+        <p:nvSpPr>
+          <p:cNvPr id="54" name="Rectangle 53">
+            <a:extLst>
+              <a:ext uri="{FF2B5EF4-FFF2-40B4-BE49-F238E27FC236}">
+                <a16:creationId xmlns:a16="http://schemas.microsoft.com/office/drawing/2014/main" id="{90B8DA4F-81CC-433C-829A-3E43D395BE78}"/>
+              </a:ext>
+              <a:ext uri="{C183D7F6-B498-43B3-948B-1728B52AA6E4}">
+                <adec:decorative xmlns:adec="http://schemas.microsoft.com/office/drawing/2017/decorative" val="1"/>
+              </a:ext>
+            </a:extLst>
+          </p:cNvPr>
+          <p:cNvSpPr>
+            <a:spLocks noGrp="1" noRot="1" noChangeAspect="1" noMove="1" noResize="1" noEditPoints="1" noAdjustHandles="1" noChangeArrowheads="1" noChangeShapeType="1" noTextEdit="1"/>
+          </p:cNvSpPr>
+          <p:nvPr>
+            <p:extLst>
+              <p:ext uri="{386F3935-93C4-4BCD-93E2-E3B085C9AB24}">
+                <p16:designElem xmlns:p16="http://schemas.microsoft.com/office/powerpoint/2015/main" val="1"/>
+              </p:ext>
+            </p:extLst>
+          </p:nvPr>
+        </p:nvSpPr>
+        <p:spPr>
+          <a:xfrm>
+            <a:off x="9111715" y="2590078"/>
+            <a:ext cx="3077109" cy="1660332"/>
+          </a:xfrm>
+          <a:prstGeom prst="rect">
+            <a:avLst/>
+          </a:prstGeom>
+          <a:solidFill>
+            <a:schemeClr val="accent1"/>
+          </a:solidFill>
+          <a:ln>
+            <a:noFill/>
+          </a:ln>
+        </p:spPr>
+        <p:style>
+          <a:lnRef idx="2">
+            <a:schemeClr val="accent1">
+              <a:shade val="50000"/>
+            </a:schemeClr>
+          </a:lnRef>
+          <a:fillRef idx="1">
+            <a:schemeClr val="accent1"/>
+          </a:fillRef>
+          <a:effectRef idx="0">
+            <a:schemeClr val="accent1"/>
+          </a:effectRef>
+          <a:fontRef idx="minor">
+            <a:schemeClr val="lt1"/>
+          </a:fontRef>
+        </p:style>
+        <p:txBody>
+          <a:bodyPr/>
+          <a:lstStyle/>
+          <a:p>
+            <a:endParaRPr lang="en-GB"/>
+          </a:p>
+        </p:txBody>
+      </p:sp>
+      <p:grpSp>
+        <p:nvGrpSpPr>
+          <p:cNvPr id="56" name="Group 55">
+            <a:extLst>
+              <a:ext uri="{FF2B5EF4-FFF2-40B4-BE49-F238E27FC236}">
+                <a16:creationId xmlns:a16="http://schemas.microsoft.com/office/drawing/2014/main" id="{965BC73A-4796-45A2-B796-26EBA296121A}"/>
+              </a:ext>
+              <a:ext uri="{C183D7F6-B498-43B3-948B-1728B52AA6E4}">
+                <adec:decorative xmlns:adec="http://schemas.microsoft.com/office/drawing/2017/decorative" val="1"/>
+              </a:ext>
+            </a:extLst>
+          </p:cNvPr>
+          <p:cNvGrpSpPr>
+            <a:grpSpLocks noGrp="1" noUngrp="1" noRot="1" noChangeAspect="1" noMove="1" noResize="1"/>
+          </p:cNvGrpSpPr>
+          <p:nvPr>
+            <p:extLst>
+              <p:ext uri="{386F3935-93C4-4BCD-93E2-E3B085C9AB24}">
+                <p16:designElem xmlns:p16="http://schemas.microsoft.com/office/powerpoint/2015/main" val="1"/>
+              </p:ext>
+            </p:extLst>
+          </p:nvPr>
+        </p:nvGrpSpPr>
+        <p:grpSpPr>
+          <a:xfrm>
+            <a:off x="-3176" y="0"/>
+            <a:ext cx="12192000" cy="6858001"/>
+            <a:chOff x="-3176" y="0"/>
+            <a:chExt cx="12192000" cy="6858001"/>
+          </a:xfrm>
+        </p:grpSpPr>
+        <p:sp useBgFill="1">
+          <p:nvSpPr>
+            <p:cNvPr id="57" name="Rectangle 56">
+              <a:extLst>
+                <a:ext uri="{FF2B5EF4-FFF2-40B4-BE49-F238E27FC236}">
+                  <a16:creationId xmlns:a16="http://schemas.microsoft.com/office/drawing/2014/main" id="{AF5727C9-D794-4E57-87C9-A38852DD41F3}"/>
+                </a:ext>
+                <a:ext uri="{C183D7F6-B498-43B3-948B-1728B52AA6E4}">
+                  <adec:decorative xmlns:adec="http://schemas.microsoft.com/office/drawing/2017/decorative" val="1"/>
+                </a:ext>
+              </a:extLst>
+            </p:cNvPr>
+            <p:cNvSpPr/>
+            <p:nvPr>
+              <p:extLst>
+                <p:ext uri="{386F3935-93C4-4BCD-93E2-E3B085C9AB24}">
+                  <p16:designElem xmlns:p16="http://schemas.microsoft.com/office/powerpoint/2015/main" val="1"/>
+                </p:ext>
+              </p:extLst>
+            </p:nvPr>
+          </p:nvSpPr>
+          <p:spPr>
+            <a:xfrm>
+              <a:off x="0" y="0"/>
+              <a:ext cx="12188824" cy="6858001"/>
+            </a:xfrm>
+            <a:prstGeom prst="rect">
+              <a:avLst/>
+            </a:prstGeom>
+            <a:ln>
+              <a:noFill/>
+            </a:ln>
+          </p:spPr>
+          <p:style>
+            <a:lnRef idx="2">
+              <a:schemeClr val="accent1">
+                <a:shade val="50000"/>
+              </a:schemeClr>
+            </a:lnRef>
+            <a:fillRef idx="1">
+              <a:schemeClr val="accent1"/>
+            </a:fillRef>
+            <a:effectRef idx="0">
+              <a:schemeClr val="accent1"/>
+            </a:effectRef>
+            <a:fontRef idx="minor">
+              <a:schemeClr val="lt1"/>
+            </a:fontRef>
+          </p:style>
+          <p:txBody>
+            <a:bodyPr rtlCol="0" anchor="ctr"/>
+            <a:lstStyle/>
+            <a:p>
+              <a:pPr algn="ctr"/>
+              <a:endParaRPr lang="en-US"/>
+            </a:p>
+          </p:txBody>
+        </p:sp>
+        <p:pic>
+          <p:nvPicPr>
+            <p:cNvPr id="58" name="Picture 57">
+              <a:extLst>
+                <a:ext uri="{FF2B5EF4-FFF2-40B4-BE49-F238E27FC236}">
+                  <a16:creationId xmlns:a16="http://schemas.microsoft.com/office/drawing/2014/main" id="{BEE62156-B691-44BD-BB34-851E0EA47180}"/>
+                </a:ext>
+                <a:ext uri="{C183D7F6-B498-43B3-948B-1728B52AA6E4}">
+                  <adec:decorative xmlns:adec="http://schemas.microsoft.com/office/drawing/2017/decorative" val="1"/>
+                </a:ext>
+              </a:extLst>
+            </p:cNvPr>
+            <p:cNvPicPr>
+              <a:picLocks noChangeAspect="1"/>
+            </p:cNvPicPr>
+            <p:nvPr>
+              <p:extLst>
+                <p:ext uri="{386F3935-93C4-4BCD-93E2-E3B085C9AB24}">
+                  <p16:designElem xmlns:p16="http://schemas.microsoft.com/office/powerpoint/2015/main" val="1"/>
+                </p:ext>
+              </p:extLst>
+            </p:nvPr>
+          </p:nvPicPr>
+          <p:blipFill>
+            <a:blip r:embed="rId2">
+              <a:alphaModFix amt="10000"/>
+              <a:extLst>
+                <a:ext uri="{28A0092B-C50C-407E-A947-70E740481C1C}">
+                  <a14:useLocalDpi xmlns:a14="http://schemas.microsoft.com/office/drawing/2010/main" val="0"/>
+                </a:ext>
+              </a:extLst>
+            </a:blip>
+            <a:stretch>
+              <a:fillRect/>
+            </a:stretch>
+          </p:blipFill>
+          <p:spPr>
+            <a:xfrm>
+              <a:off x="-3176" y="0"/>
+              <a:ext cx="12192000" cy="6858000"/>
+            </a:xfrm>
+            <a:prstGeom prst="rect">
+              <a:avLst/>
+            </a:prstGeom>
+          </p:spPr>
+        </p:pic>
+      </p:grpSp>
+      <p:sp>
+        <p:nvSpPr>
+          <p:cNvPr id="60" name="Rectangle 59">
+            <a:extLst>
+              <a:ext uri="{FF2B5EF4-FFF2-40B4-BE49-F238E27FC236}">
+                <a16:creationId xmlns:a16="http://schemas.microsoft.com/office/drawing/2014/main" id="{B2472D2F-3BE0-4051-AC90-8E51A01FAC94}"/>
+              </a:ext>
+              <a:ext uri="{C183D7F6-B498-43B3-948B-1728B52AA6E4}">
+                <adec:decorative xmlns:adec="http://schemas.microsoft.com/office/drawing/2017/decorative" val="1"/>
+              </a:ext>
+            </a:extLst>
+          </p:cNvPr>
+          <p:cNvSpPr>
+            <a:spLocks noGrp="1" noRot="1" noChangeAspect="1" noMove="1" noResize="1" noEditPoints="1" noAdjustHandles="1" noChangeArrowheads="1" noChangeShapeType="1" noTextEdit="1"/>
+          </p:cNvSpPr>
+          <p:nvPr>
+            <p:extLst>
+              <p:ext uri="{386F3935-93C4-4BCD-93E2-E3B085C9AB24}">
+                <p16:designElem xmlns:p16="http://schemas.microsoft.com/office/powerpoint/2015/main" val="1"/>
+              </p:ext>
+            </p:extLst>
+          </p:nvPr>
+        </p:nvSpPr>
+        <p:spPr bwMode="grayWhite">
+          <a:xfrm>
+            <a:off x="0" y="4557357"/>
+            <a:ext cx="8129873" cy="1660332"/>
+          </a:xfrm>
+          <a:prstGeom prst="rect">
+            <a:avLst/>
+          </a:prstGeom>
+          <a:solidFill>
+            <a:schemeClr val="bg1">
+              <a:lumMod val="95000"/>
+              <a:lumOff val="5000"/>
+              <a:alpha val="90000"/>
+            </a:schemeClr>
+          </a:solidFill>
+          <a:ln>
+            <a:noFill/>
+          </a:ln>
+        </p:spPr>
+        <p:style>
+          <a:lnRef idx="2">
+            <a:schemeClr val="accent1">
+              <a:shade val="50000"/>
+            </a:schemeClr>
+          </a:lnRef>
+          <a:fillRef idx="1">
+            <a:schemeClr val="accent1"/>
+          </a:fillRef>
+          <a:effectRef idx="0">
+            <a:schemeClr val="accent1"/>
+          </a:effectRef>
+          <a:fontRef idx="minor">
+            <a:schemeClr val="lt1"/>
+          </a:fontRef>
+        </p:style>
+        <p:txBody>
+          <a:bodyPr/>
+          <a:lstStyle/>
+          <a:p>
+            <a:endParaRPr lang="en-GB"/>
+          </a:p>
+        </p:txBody>
+      </p:sp>
+      <p:sp>
+        <p:nvSpPr>
+          <p:cNvPr id="2" name="Title 1">
+            <a:extLst>
+              <a:ext uri="{FF2B5EF4-FFF2-40B4-BE49-F238E27FC236}">
+                <a16:creationId xmlns:a16="http://schemas.microsoft.com/office/drawing/2014/main" id="{C18DA90E-12BA-1987-8BE8-5B8912ADFAB0}"/>
+              </a:ext>
+            </a:extLst>
+          </p:cNvPr>
+          <p:cNvSpPr>
+            <a:spLocks noGrp="1"/>
+          </p:cNvSpPr>
+          <p:nvPr>
+            <p:ph type="title"/>
+          </p:nvPr>
+        </p:nvSpPr>
+        <p:spPr>
+          <a:xfrm>
+            <a:off x="690908" y="4710483"/>
+            <a:ext cx="7284680" cy="940240"/>
+          </a:xfrm>
+        </p:spPr>
+        <p:txBody>
+          <a:bodyPr vert="horz" lIns="91440" tIns="45720" rIns="91440" bIns="45720" rtlCol="0" anchor="b">
+            <a:normAutofit/>
+          </a:bodyPr>
+          <a:lstStyle/>
+          <a:p>
+            <a:pPr algn="r"/>
+            <a:r>
+              <a:rPr lang="en-US" sz="4800"/>
+              <a:t>Low Fidelity Prototype </a:t>
+            </a:r>
+          </a:p>
+        </p:txBody>
+      </p:sp>
+      <p:pic>
+        <p:nvPicPr>
+          <p:cNvPr id="14" name="Picture 13" descr="A map with writing on paper&#10;&#10;AI-generated content may be incorrect.">
+            <a:extLst>
+              <a:ext uri="{FF2B5EF4-FFF2-40B4-BE49-F238E27FC236}">
+                <a16:creationId xmlns:a16="http://schemas.microsoft.com/office/drawing/2014/main" id="{6624A5A2-B695-5EBB-0B4A-116E230021B7}"/>
+              </a:ext>
+            </a:extLst>
+          </p:cNvPr>
+          <p:cNvPicPr>
+            <a:picLocks noChangeAspect="1"/>
+          </p:cNvPicPr>
+          <p:nvPr/>
+        </p:nvPicPr>
+        <p:blipFill>
+          <a:blip r:embed="rId5">
+            <a:extLst>
+              <a:ext uri="{28A0092B-C50C-407E-A947-70E740481C1C}">
+                <a14:useLocalDpi xmlns:a14="http://schemas.microsoft.com/office/drawing/2010/main" val="0"/>
+              </a:ext>
+            </a:extLst>
+          </a:blip>
+          <a:srcRect l="18408" r="6744" b="2"/>
+          <a:stretch>
+            <a:fillRect/>
+          </a:stretch>
+        </p:blipFill>
+        <p:spPr>
+          <a:xfrm>
+            <a:off x="97928" y="224694"/>
+            <a:ext cx="2566341" cy="3609141"/>
+          </a:xfrm>
+          <a:prstGeom prst="rect">
+            <a:avLst/>
+          </a:prstGeom>
+          <a:ln>
+            <a:noFill/>
+          </a:ln>
+          <a:effectLst>
+            <a:outerShdw blurRad="76200" dist="63500" dir="5040000" algn="tl" rotWithShape="0">
+              <a:srgbClr val="000000">
+                <a:alpha val="41000"/>
+              </a:srgbClr>
+            </a:outerShdw>
+          </a:effectLst>
+        </p:spPr>
+      </p:pic>
+      <p:pic>
+        <p:nvPicPr>
+          <p:cNvPr id="16" name="Picture 15" descr="A drawing of a cell phone">
+            <a:extLst>
+              <a:ext uri="{FF2B5EF4-FFF2-40B4-BE49-F238E27FC236}">
+                <a16:creationId xmlns:a16="http://schemas.microsoft.com/office/drawing/2014/main" id="{33F41258-E902-D5D0-1159-9BC940FD1D8A}"/>
+              </a:ext>
+            </a:extLst>
+          </p:cNvPr>
+          <p:cNvPicPr>
+            <a:picLocks noChangeAspect="1"/>
+          </p:cNvPicPr>
+          <p:nvPr/>
+        </p:nvPicPr>
+        <p:blipFill>
+          <a:blip r:embed="rId6">
+            <a:extLst>
+              <a:ext uri="{28A0092B-C50C-407E-A947-70E740481C1C}">
+                <a14:useLocalDpi xmlns:a14="http://schemas.microsoft.com/office/drawing/2010/main" val="0"/>
+              </a:ext>
+            </a:extLst>
+          </a:blip>
+          <a:srcRect l="21369" r="25365" b="-4"/>
+          <a:stretch>
+            <a:fillRect/>
+          </a:stretch>
+        </p:blipFill>
+        <p:spPr>
+          <a:xfrm>
+            <a:off x="2873370" y="224694"/>
+            <a:ext cx="2563166" cy="3609142"/>
+          </a:xfrm>
+          <a:prstGeom prst="rect">
+            <a:avLst/>
+          </a:prstGeom>
+          <a:ln>
+            <a:noFill/>
+          </a:ln>
+          <a:effectLst>
+            <a:outerShdw blurRad="76200" dist="63500" dir="5040000" algn="tl" rotWithShape="0">
+              <a:srgbClr val="000000">
+                <a:alpha val="41000"/>
+              </a:srgbClr>
+            </a:outerShdw>
+          </a:effectLst>
+        </p:spPr>
+      </p:pic>
+      <p:pic>
+        <p:nvPicPr>
+          <p:cNvPr id="10" name="Picture 9" descr="A paper with text and a list of tickets&#10;&#10;AI-generated content may be incorrect.">
+            <a:extLst>
+              <a:ext uri="{FF2B5EF4-FFF2-40B4-BE49-F238E27FC236}">
+                <a16:creationId xmlns:a16="http://schemas.microsoft.com/office/drawing/2014/main" id="{EECE7684-2C47-F9DE-B0B8-946244FAB091}"/>
+              </a:ext>
+            </a:extLst>
+          </p:cNvPr>
+          <p:cNvPicPr>
+            <a:picLocks noChangeAspect="1"/>
+          </p:cNvPicPr>
+          <p:nvPr/>
+        </p:nvPicPr>
+        <p:blipFill>
+          <a:blip r:embed="rId7">
+            <a:extLst>
+              <a:ext uri="{28A0092B-C50C-407E-A947-70E740481C1C}">
+                <a14:useLocalDpi xmlns:a14="http://schemas.microsoft.com/office/drawing/2010/main" val="0"/>
+              </a:ext>
+            </a:extLst>
+          </a:blip>
+          <a:srcRect l="8837" r="2" b="2"/>
+          <a:stretch>
+            <a:fillRect/>
+          </a:stretch>
+        </p:blipFill>
+        <p:spPr>
+          <a:xfrm>
+            <a:off x="5645637" y="224695"/>
+            <a:ext cx="2566342" cy="3609141"/>
+          </a:xfrm>
+          <a:prstGeom prst="rect">
+            <a:avLst/>
+          </a:prstGeom>
+          <a:ln>
+            <a:noFill/>
+          </a:ln>
+          <a:effectLst>
+            <a:outerShdw blurRad="76200" dist="63500" dir="5040000" algn="tl" rotWithShape="0">
+              <a:srgbClr val="000000">
+                <a:alpha val="41000"/>
+              </a:srgbClr>
+            </a:outerShdw>
+          </a:effectLst>
+        </p:spPr>
+      </p:pic>
+      <p:pic>
+        <p:nvPicPr>
+          <p:cNvPr id="12" name="Picture 11" descr="A drawing of a phone&#10;&#10;AI-generated content may be incorrect.">
+            <a:extLst>
+              <a:ext uri="{FF2B5EF4-FFF2-40B4-BE49-F238E27FC236}">
+                <a16:creationId xmlns:a16="http://schemas.microsoft.com/office/drawing/2014/main" id="{905014FF-B387-1C1C-B307-5FF7E16645E8}"/>
+              </a:ext>
+            </a:extLst>
+          </p:cNvPr>
+          <p:cNvPicPr>
+            <a:picLocks noChangeAspect="1"/>
+          </p:cNvPicPr>
+          <p:nvPr/>
+        </p:nvPicPr>
+        <p:blipFill>
+          <a:blip r:embed="rId8">
+            <a:extLst>
+              <a:ext uri="{28A0092B-C50C-407E-A947-70E740481C1C}">
+                <a14:useLocalDpi xmlns:a14="http://schemas.microsoft.com/office/drawing/2010/main" val="0"/>
+              </a:ext>
+            </a:extLst>
+          </a:blip>
+          <a:srcRect l="8249" r="2" b="2"/>
+          <a:stretch>
+            <a:fillRect/>
+          </a:stretch>
+        </p:blipFill>
+        <p:spPr>
+          <a:xfrm>
+            <a:off x="8999449" y="224696"/>
+            <a:ext cx="2566341" cy="3609141"/>
+          </a:xfrm>
+          <a:prstGeom prst="rect">
+            <a:avLst/>
+          </a:prstGeom>
+          <a:ln>
+            <a:noFill/>
+          </a:ln>
+          <a:effectLst>
+            <a:outerShdw blurRad="76200" dist="63500" dir="5040000" algn="tl" rotWithShape="0">
+              <a:srgbClr val="000000">
+                <a:alpha val="41000"/>
+              </a:srgbClr>
+            </a:outerShdw>
+          </a:effectLst>
+        </p:spPr>
+      </p:pic>
+      <p:sp>
+        <p:nvSpPr>
+          <p:cNvPr id="62" name="Rectangle 61">
+            <a:extLst>
+              <a:ext uri="{FF2B5EF4-FFF2-40B4-BE49-F238E27FC236}">
+                <a16:creationId xmlns:a16="http://schemas.microsoft.com/office/drawing/2014/main" id="{87BE568E-F17F-4B39-B120-64045D620410}"/>
+              </a:ext>
+              <a:ext uri="{C183D7F6-B498-43B3-948B-1728B52AA6E4}">
+                <adec:decorative xmlns:adec="http://schemas.microsoft.com/office/drawing/2017/decorative" val="1"/>
+              </a:ext>
+            </a:extLst>
+          </p:cNvPr>
+          <p:cNvSpPr>
+            <a:spLocks noGrp="1" noRot="1" noChangeAspect="1" noMove="1" noResize="1" noEditPoints="1" noAdjustHandles="1" noChangeArrowheads="1" noChangeShapeType="1" noTextEdit="1"/>
+          </p:cNvSpPr>
+          <p:nvPr>
+            <p:extLst>
+              <p:ext uri="{386F3935-93C4-4BCD-93E2-E3B085C9AB24}">
+                <p16:designElem xmlns:p16="http://schemas.microsoft.com/office/powerpoint/2015/main" val="1"/>
+              </p:ext>
+            </p:extLst>
+          </p:nvPr>
+        </p:nvSpPr>
+        <p:spPr>
+          <a:xfrm>
+            <a:off x="8273503" y="4557357"/>
+            <a:ext cx="3925907" cy="1660332"/>
+          </a:xfrm>
+          <a:prstGeom prst="rect">
+            <a:avLst/>
+          </a:prstGeom>
+          <a:solidFill>
+            <a:schemeClr val="accent1"/>
+          </a:solidFill>
+          <a:ln>
+            <a:noFill/>
+          </a:ln>
+        </p:spPr>
+        <p:style>
+          <a:lnRef idx="2">
+            <a:schemeClr val="accent1">
+              <a:shade val="50000"/>
+            </a:schemeClr>
+          </a:lnRef>
+          <a:fillRef idx="1">
+            <a:schemeClr val="accent1"/>
+          </a:fillRef>
+          <a:effectRef idx="0">
+            <a:schemeClr val="accent1"/>
+          </a:effectRef>
+          <a:fontRef idx="minor">
+            <a:schemeClr val="lt1"/>
+          </a:fontRef>
+        </p:style>
+        <p:txBody>
+          <a:bodyPr/>
+          <a:lstStyle/>
+          <a:p>
+            <a:endParaRPr lang="en-GB"/>
+          </a:p>
+        </p:txBody>
+      </p:sp>
+      <p:sp>
+        <p:nvSpPr>
+          <p:cNvPr id="64" name="Rectangle 63">
+            <a:extLst>
+              <a:ext uri="{FF2B5EF4-FFF2-40B4-BE49-F238E27FC236}">
+                <a16:creationId xmlns:a16="http://schemas.microsoft.com/office/drawing/2014/main" id="{43C5BE71-5366-4573-B633-B22A0EB5B4E2}"/>
+              </a:ext>
+              <a:ext uri="{C183D7F6-B498-43B3-948B-1728B52AA6E4}">
+                <adec:decorative xmlns:adec="http://schemas.microsoft.com/office/drawing/2017/decorative" val="1"/>
+              </a:ext>
+            </a:extLst>
+          </p:cNvPr>
+          <p:cNvSpPr>
+            <a:spLocks noGrp="1" noRot="1" noChangeAspect="1" noMove="1" noResize="1" noEditPoints="1" noAdjustHandles="1" noChangeArrowheads="1" noChangeShapeType="1" noTextEdit="1"/>
+          </p:cNvSpPr>
+          <p:nvPr>
+            <p:extLst>
+              <p:ext uri="{386F3935-93C4-4BCD-93E2-E3B085C9AB24}">
+                <p16:designElem xmlns:p16="http://schemas.microsoft.com/office/powerpoint/2015/main" val="1"/>
+              </p:ext>
+            </p:extLst>
+          </p:nvPr>
+        </p:nvSpPr>
+        <p:spPr>
+          <a:xfrm>
+            <a:off x="10586" y="6210130"/>
+            <a:ext cx="8119287" cy="275942"/>
+          </a:xfrm>
+          <a:prstGeom prst="rect">
+            <a:avLst/>
+          </a:prstGeom>
+          <a:blipFill>
+            <a:blip r:embed="rId9"/>
+            <a:stretch>
+              <a:fillRect/>
+            </a:stretch>
+          </a:blipFill>
+          <a:ln>
+            <a:noFill/>
+          </a:ln>
+        </p:spPr>
+        <p:style>
+          <a:lnRef idx="2">
+            <a:schemeClr val="accent1">
+              <a:shade val="50000"/>
+            </a:schemeClr>
+          </a:lnRef>
+          <a:fillRef idx="1">
+            <a:schemeClr val="accent1"/>
+          </a:fillRef>
+          <a:effectRef idx="0">
+            <a:schemeClr val="accent1"/>
+          </a:effectRef>
+          <a:fontRef idx="minor">
+            <a:schemeClr val="lt1"/>
+          </a:fontRef>
+        </p:style>
+        <p:txBody>
+          <a:bodyPr rtlCol="0" anchor="ctr"/>
+          <a:lstStyle/>
+          <a:p>
+            <a:pPr algn="ctr"/>
+            <a:endParaRPr lang="en-US"/>
+          </a:p>
+        </p:txBody>
+      </p:sp>
+      <p:sp>
+        <p:nvSpPr>
+          <p:cNvPr id="66" name="Rectangle 65">
+            <a:extLst>
+              <a:ext uri="{FF2B5EF4-FFF2-40B4-BE49-F238E27FC236}">
+                <a16:creationId xmlns:a16="http://schemas.microsoft.com/office/drawing/2014/main" id="{7B781A16-5531-45CC-9E5E-84FD03DDC70E}"/>
+              </a:ext>
+              <a:ext uri="{C183D7F6-B498-43B3-948B-1728B52AA6E4}">
+                <adec:decorative xmlns:adec="http://schemas.microsoft.com/office/drawing/2017/decorative" val="1"/>
+              </a:ext>
+            </a:extLst>
+          </p:cNvPr>
+          <p:cNvSpPr>
+            <a:spLocks noGrp="1" noRot="1" noChangeAspect="1" noMove="1" noResize="1" noEditPoints="1" noAdjustHandles="1" noChangeArrowheads="1" noChangeShapeType="1" noTextEdit="1"/>
+          </p:cNvSpPr>
+          <p:nvPr>
+            <p:extLst>
+              <p:ext uri="{386F3935-93C4-4BCD-93E2-E3B085C9AB24}">
+                <p16:designElem xmlns:p16="http://schemas.microsoft.com/office/powerpoint/2015/main" val="1"/>
+              </p:ext>
+            </p:extLst>
+          </p:nvPr>
+        </p:nvSpPr>
+        <p:spPr>
+          <a:xfrm>
+            <a:off x="8284159" y="6210130"/>
+            <a:ext cx="3918428" cy="275942"/>
+          </a:xfrm>
+          <a:prstGeom prst="rect">
+            <a:avLst/>
+          </a:prstGeom>
+          <a:blipFill>
+            <a:blip r:embed="rId10"/>
+            <a:stretch>
+              <a:fillRect/>
+            </a:stretch>
+          </a:blipFill>
+          <a:ln>
+            <a:noFill/>
+          </a:ln>
+        </p:spPr>
+        <p:style>
+          <a:lnRef idx="2">
+            <a:schemeClr val="accent1">
+              <a:shade val="50000"/>
+            </a:schemeClr>
+          </a:lnRef>
+          <a:fillRef idx="1">
+            <a:schemeClr val="accent1"/>
+          </a:fillRef>
+          <a:effectRef idx="0">
+            <a:schemeClr val="accent1"/>
+          </a:effectRef>
+          <a:fontRef idx="minor">
+            <a:schemeClr val="lt1"/>
+          </a:fontRef>
+        </p:style>
+        <p:txBody>
+          <a:bodyPr rtlCol="0" anchor="ctr"/>
+          <a:lstStyle/>
+          <a:p>
+            <a:pPr algn="ctr"/>
+            <a:endParaRPr lang="en-US"/>
+          </a:p>
+        </p:txBody>
+      </p:sp>
+      <p:pic>
+        <p:nvPicPr>
+          <p:cNvPr id="24" name="Picture 23" descr="A drawing of a logo&#10;&#10;AI-generated content may be incorrect.">
+            <a:extLst>
+              <a:ext uri="{FF2B5EF4-FFF2-40B4-BE49-F238E27FC236}">
+                <a16:creationId xmlns:a16="http://schemas.microsoft.com/office/drawing/2014/main" id="{C25E1441-7649-4C3B-CD98-BFD4AAA88B3B}"/>
+              </a:ext>
+            </a:extLst>
+          </p:cNvPr>
+          <p:cNvPicPr>
+            <a:picLocks noChangeAspect="1"/>
+          </p:cNvPicPr>
+          <p:nvPr/>
+        </p:nvPicPr>
+        <p:blipFill>
+          <a:blip r:embed="rId11">
+            <a:extLst>
+              <a:ext uri="{28A0092B-C50C-407E-A947-70E740481C1C}">
+                <a14:useLocalDpi xmlns:a14="http://schemas.microsoft.com/office/drawing/2010/main" val="0"/>
+              </a:ext>
+            </a:extLst>
+          </a:blip>
+          <a:stretch>
+            <a:fillRect/>
+          </a:stretch>
+        </p:blipFill>
+        <p:spPr>
+          <a:xfrm>
+            <a:off x="8211979" y="3885863"/>
+            <a:ext cx="3885268" cy="2913951"/>
+          </a:xfrm>
+          <a:prstGeom prst="rect">
+            <a:avLst/>
+          </a:prstGeom>
+        </p:spPr>
+      </p:pic>
+    </p:spTree>
+    <p:extLst>
+      <p:ext uri="{BB962C8B-B14F-4D97-AF65-F5344CB8AC3E}">
+        <p14:creationId xmlns:p14="http://schemas.microsoft.com/office/powerpoint/2010/main" val="3384190235"/>
+      </p:ext>
+    </p:extLst>
+  </p:cSld>
+  <p:clrMapOvr>
+    <a:masterClrMapping/>
+  </p:clrMapOvr>
+  <p:timing>
+    <p:tnLst>
+      <p:par>
+        <p:cTn id="1" dur="indefinite" restart="never" nodeType="tmRoot">
+          <p:childTnLst>
+            <p:seq concurrent="1" nextAc="seek">
+              <p:cTn id="2" dur="indefinite" nodeType="mainSeq">
+                <p:childTnLst>
+                  <p:par>
+                    <p:cTn id="3" fill="hold">
+                      <p:stCondLst>
+                        <p:cond delay="indefinite"/>
+                        <p:cond evt="onBegin" delay="0">
+                          <p:tn val="2"/>
+                        </p:cond>
+                      </p:stCondLst>
+                      <p:childTnLst>
+                        <p:par>
+                          <p:cTn id="4" fill="hold">
+                            <p:stCondLst>
+                              <p:cond delay="0"/>
+                            </p:stCondLst>
+                            <p:childTnLst>
+                              <p:par>
+                                <p:cTn id="5" presetID="10" presetClass="entr" presetSubtype="0" fill="hold" grpId="0" nodeType="withEffect">
+                                  <p:stCondLst>
+                                    <p:cond delay="1000"/>
+                                  </p:stCondLst>
+                                  <p:iterate>
+                                    <p:tmPct val="10000"/>
+                                  </p:iterate>
+                                  <p:childTnLst>
+                                    <p:set>
+                                      <p:cBhvr>
+                                        <p:cTn id="6" dur="1" fill="hold">
+                                          <p:stCondLst>
+                                            <p:cond delay="0"/>
+                                          </p:stCondLst>
+                                        </p:cTn>
+                                        <p:tgtEl>
+                                          <p:spTgt spid="2"/>
+                                        </p:tgtEl>
+                                        <p:attrNameLst>
+                                          <p:attrName>style.visibility</p:attrName>
+                                        </p:attrNameLst>
+                                      </p:cBhvr>
+                                      <p:to>
+                                        <p:strVal val="visible"/>
+                                      </p:to>
+                                    </p:set>
+                                    <p:animEffect transition="in" filter="fade">
+                                      <p:cBhvr>
+                                        <p:cTn id="7" dur="700"/>
+                                        <p:tgtEl>
+                                          <p:spTgt spid="2"/>
+                                        </p:tgtEl>
+                                      </p:cBhvr>
+                                    </p:animEffect>
+                                  </p:childTnLst>
+                                </p:cTn>
+                              </p:par>
+                            </p:childTnLst>
+                          </p:cTn>
+                        </p:par>
+                      </p:childTnLst>
+                    </p:cTn>
+                  </p:par>
+                </p:childTnLst>
+              </p:cTn>
+              <p:prevCondLst>
+                <p:cond evt="onPrev" delay="0">
+                  <p:tgtEl>
+                    <p:sldTgt/>
+                  </p:tgtEl>
+                </p:cond>
+              </p:prevCondLst>
+              <p:nextCondLst>
+                <p:cond evt="onNext" delay="0">
+                  <p:tgtEl>
+                    <p:sldTgt/>
+                  </p:tgtEl>
+                </p:cond>
+              </p:nextCondLst>
+            </p:seq>
+          </p:childTnLst>
+        </p:cTn>
+      </p:par>
+    </p:tnLst>
+    <p:bldLst>
+      <p:bldP spid="2" grpId="0"/>
+    </p:bldLst>
+  </p:timing>
+</p:sld>
+</file>
+
+<file path=ppt/slides/slide18.xml><?xml version="1.0" encoding="utf-8"?>
+<p:sld xmlns:a="http://schemas.openxmlformats.org/drawingml/2006/main" xmlns:r="http://schemas.openxmlformats.org/officeDocument/2006/relationships" xmlns:p="http://schemas.openxmlformats.org/presentationml/2006/main">
+  <p:cSld>
     <p:spTree>
       <p:nvGrpSpPr>
         <p:cNvPr id="1" name=""/>
@@ -18366,20 +19459,18 @@
 </p:sld>
 </file>
 
-<file path=ppt/slides/slide18.xml><?xml version="1.0" encoding="utf-8"?>
+<file path=ppt/slides/slide19.xml><?xml version="1.0" encoding="utf-8"?>
 <p:sld xmlns:a="http://schemas.openxmlformats.org/drawingml/2006/main" xmlns:r="http://schemas.openxmlformats.org/officeDocument/2006/relationships" xmlns:p="http://schemas.openxmlformats.org/presentationml/2006/main">
   <p:cSld>
-    <p:bg>
-      <p:bgPr>
-        <a:solidFill>
-          <a:schemeClr val="bg1"/>
-        </a:solidFill>
-        <a:effectLst/>
-      </p:bgPr>
-    </p:bg>
     <p:spTree>
       <p:nvGrpSpPr>
-        <p:cNvPr id="1" name=""/>
+        <p:cNvPr id="1" name="">
+          <a:extLst>
+            <a:ext uri="{FF2B5EF4-FFF2-40B4-BE49-F238E27FC236}">
+              <a16:creationId xmlns:a16="http://schemas.microsoft.com/office/drawing/2014/main" id="{5F882E93-CFF5-61F7-E432-651076ED9131}"/>
+            </a:ext>
+          </a:extLst>
+        </p:cNvPr>
         <p:cNvGrpSpPr/>
         <p:nvPr/>
       </p:nvGrpSpPr>
@@ -18391,286 +19482,66 @@
           <a:chExt cx="0" cy="0"/>
         </a:xfrm>
       </p:grpSpPr>
-      <p:pic>
-        <p:nvPicPr>
-          <p:cNvPr id="3" name="Picture 2" descr="A screenshot of a phone&#10;&#10;AI-generated content may be incorrect.">
+      <p:sp>
+        <p:nvSpPr>
+          <p:cNvPr id="2" name="Title 1">
             <a:extLst>
               <a:ext uri="{FF2B5EF4-FFF2-40B4-BE49-F238E27FC236}">
-                <a16:creationId xmlns:a16="http://schemas.microsoft.com/office/drawing/2014/main" id="{0C606BCE-BD40-6E3A-264A-D2EBA65E1F5F}"/>
+                <a16:creationId xmlns:a16="http://schemas.microsoft.com/office/drawing/2014/main" id="{DE44C7D4-B02B-C1CD-A336-E9B322AE81A1}"/>
               </a:ext>
             </a:extLst>
           </p:cNvPr>
-          <p:cNvPicPr>
-            <a:picLocks noChangeAspect="1"/>
-          </p:cNvPicPr>
-          <p:nvPr/>
-        </p:nvPicPr>
-        <p:blipFill>
-          <a:blip r:embed="rId2"/>
-          <a:stretch>
-            <a:fillRect/>
-          </a:stretch>
-        </p:blipFill>
-        <p:spPr>
-          <a:xfrm>
-            <a:off x="740224" y="1123527"/>
-            <a:ext cx="2049136" cy="4604800"/>
-          </a:xfrm>
-          <a:prstGeom prst="rect">
-            <a:avLst/>
-          </a:prstGeom>
-        </p:spPr>
-      </p:pic>
-      <p:cxnSp>
-        <p:nvCxnSpPr>
-          <p:cNvPr id="10" name="Straight Connector 9">
+          <p:cNvSpPr>
+            <a:spLocks noGrp="1"/>
+          </p:cNvSpPr>
+          <p:nvPr>
+            <p:ph type="title"/>
+          </p:nvPr>
+        </p:nvSpPr>
+        <p:spPr/>
+        <p:txBody>
+          <a:bodyPr/>
+          <a:lstStyle/>
+          <a:p>
+            <a:r>
+              <a:rPr lang="en-GB" dirty="0"/>
+              <a:t>High Fidelity Prototype </a:t>
+            </a:r>
+          </a:p>
+        </p:txBody>
+      </p:sp>
+      <p:sp>
+        <p:nvSpPr>
+          <p:cNvPr id="4" name="Content Placeholder 3">
             <a:extLst>
               <a:ext uri="{FF2B5EF4-FFF2-40B4-BE49-F238E27FC236}">
-                <a16:creationId xmlns:a16="http://schemas.microsoft.com/office/drawing/2014/main" id="{50DA1EB8-87CF-4588-A1FD-4756F9A28F6B}"/>
-              </a:ext>
-              <a:ext uri="{C183D7F6-B498-43B3-948B-1728B52AA6E4}">
-                <adec:decorative xmlns:adec="http://schemas.microsoft.com/office/drawing/2017/decorative" val="1"/>
+                <a16:creationId xmlns:a16="http://schemas.microsoft.com/office/drawing/2014/main" id="{5E659616-A1E2-35E8-1EF2-35D92EDAFDFC}"/>
               </a:ext>
             </a:extLst>
           </p:cNvPr>
-          <p:cNvCxnSpPr>
-            <a:cxnSpLocks noGrp="1" noRot="1" noChangeAspect="1" noMove="1" noResize="1" noEditPoints="1" noAdjustHandles="1" noChangeArrowheads="1" noChangeShapeType="1"/>
-          </p:cNvCxnSpPr>
-          <p:nvPr>
-            <p:extLst>
-              <p:ext uri="{386F3935-93C4-4BCD-93E2-E3B085C9AB24}">
-                <p16:designElem xmlns:p16="http://schemas.microsoft.com/office/powerpoint/2015/main" val="1"/>
-              </p:ext>
-            </p:extLst>
-          </p:nvPr>
-        </p:nvCxnSpPr>
-        <p:spPr>
-          <a:xfrm>
-            <a:off x="3210079" y="1573887"/>
-            <a:ext cx="0" cy="3710227"/>
-          </a:xfrm>
-          <a:prstGeom prst="line">
-            <a:avLst/>
-          </a:prstGeom>
-          <a:ln w="19050">
-            <a:solidFill>
-              <a:srgbClr val="7F7F7F"/>
-            </a:solidFill>
-          </a:ln>
-        </p:spPr>
-        <p:style>
-          <a:lnRef idx="1">
-            <a:schemeClr val="accent1"/>
-          </a:lnRef>
-          <a:fillRef idx="0">
-            <a:schemeClr val="accent1"/>
-          </a:fillRef>
-          <a:effectRef idx="0">
-            <a:schemeClr val="accent1"/>
-          </a:effectRef>
-          <a:fontRef idx="minor">
-            <a:schemeClr val="tx1"/>
-          </a:fontRef>
-        </p:style>
-      </p:cxnSp>
-      <p:pic>
-        <p:nvPicPr>
-          <p:cNvPr id="2" name="Picture 1" descr="A screenshot of a map&#10;&#10;AI-generated content may be incorrect.">
-            <a:extLst>
-              <a:ext uri="{FF2B5EF4-FFF2-40B4-BE49-F238E27FC236}">
-                <a16:creationId xmlns:a16="http://schemas.microsoft.com/office/drawing/2014/main" id="{DC8F1EF1-5ECE-75E9-ED6E-E9FECAF159F1}"/>
-              </a:ext>
-            </a:extLst>
-          </p:cNvPr>
-          <p:cNvPicPr>
-            <a:picLocks noChangeAspect="1"/>
-          </p:cNvPicPr>
-          <p:nvPr/>
-        </p:nvPicPr>
-        <p:blipFill>
-          <a:blip r:embed="rId3"/>
-          <a:stretch>
-            <a:fillRect/>
-          </a:stretch>
-        </p:blipFill>
-        <p:spPr>
-          <a:xfrm>
-            <a:off x="3598711" y="1123527"/>
-            <a:ext cx="2072160" cy="4604800"/>
-          </a:xfrm>
-          <a:prstGeom prst="rect">
-            <a:avLst/>
-          </a:prstGeom>
-        </p:spPr>
-      </p:pic>
-      <p:cxnSp>
-        <p:nvCxnSpPr>
-          <p:cNvPr id="12" name="Straight Connector 11">
-            <a:extLst>
-              <a:ext uri="{FF2B5EF4-FFF2-40B4-BE49-F238E27FC236}">
-                <a16:creationId xmlns:a16="http://schemas.microsoft.com/office/drawing/2014/main" id="{D7A4E378-EA57-47B9-B1EB-58B998F6CFFB}"/>
-              </a:ext>
-              <a:ext uri="{C183D7F6-B498-43B3-948B-1728B52AA6E4}">
-                <adec:decorative xmlns:adec="http://schemas.microsoft.com/office/drawing/2017/decorative" val="1"/>
-              </a:ext>
-            </a:extLst>
-          </p:cNvPr>
-          <p:cNvCxnSpPr>
-            <a:cxnSpLocks noGrp="1" noRot="1" noChangeAspect="1" noMove="1" noResize="1" noEditPoints="1" noAdjustHandles="1" noChangeArrowheads="1" noChangeShapeType="1"/>
-          </p:cNvCxnSpPr>
-          <p:nvPr>
-            <p:extLst>
-              <p:ext uri="{386F3935-93C4-4BCD-93E2-E3B085C9AB24}">
-                <p16:designElem xmlns:p16="http://schemas.microsoft.com/office/powerpoint/2015/main" val="1"/>
-              </p:ext>
-            </p:extLst>
-          </p:nvPr>
-        </p:nvCxnSpPr>
-        <p:spPr>
-          <a:xfrm>
-            <a:off x="6072595" y="1573887"/>
-            <a:ext cx="0" cy="3710227"/>
-          </a:xfrm>
-          <a:prstGeom prst="line">
-            <a:avLst/>
-          </a:prstGeom>
-          <a:ln w="19050">
-            <a:solidFill>
-              <a:srgbClr val="7F7F7F"/>
-            </a:solidFill>
-          </a:ln>
-        </p:spPr>
-        <p:style>
-          <a:lnRef idx="1">
-            <a:schemeClr val="accent1"/>
-          </a:lnRef>
-          <a:fillRef idx="0">
-            <a:schemeClr val="accent1"/>
-          </a:fillRef>
-          <a:effectRef idx="0">
-            <a:schemeClr val="accent1"/>
-          </a:effectRef>
-          <a:fontRef idx="minor">
-            <a:schemeClr val="tx1"/>
-          </a:fontRef>
-        </p:style>
-      </p:cxnSp>
-      <p:pic>
-        <p:nvPicPr>
-          <p:cNvPr id="5" name="Picture 4" descr="A screenshot of a cell phone&#10;&#10;AI-generated content may be incorrect.">
-            <a:extLst>
-              <a:ext uri="{FF2B5EF4-FFF2-40B4-BE49-F238E27FC236}">
-                <a16:creationId xmlns:a16="http://schemas.microsoft.com/office/drawing/2014/main" id="{8A58D5AB-8356-EA36-8846-C6FC8F5E82CA}"/>
-              </a:ext>
-            </a:extLst>
-          </p:cNvPr>
-          <p:cNvPicPr>
-            <a:picLocks noChangeAspect="1"/>
-          </p:cNvPicPr>
-          <p:nvPr/>
-        </p:nvPicPr>
-        <p:blipFill>
-          <a:blip r:embed="rId4"/>
-          <a:stretch>
-            <a:fillRect/>
-          </a:stretch>
-        </p:blipFill>
-        <p:spPr>
-          <a:xfrm>
-            <a:off x="6439514" y="1123527"/>
-            <a:ext cx="2152744" cy="4604800"/>
-          </a:xfrm>
-          <a:prstGeom prst="rect">
-            <a:avLst/>
-          </a:prstGeom>
-        </p:spPr>
-      </p:pic>
-      <p:cxnSp>
-        <p:nvCxnSpPr>
-          <p:cNvPr id="14" name="Straight Connector 13">
-            <a:extLst>
-              <a:ext uri="{FF2B5EF4-FFF2-40B4-BE49-F238E27FC236}">
-                <a16:creationId xmlns:a16="http://schemas.microsoft.com/office/drawing/2014/main" id="{D2B31ED6-76F0-425A-9A41-C947AEF9C145}"/>
-              </a:ext>
-              <a:ext uri="{C183D7F6-B498-43B3-948B-1728B52AA6E4}">
-                <adec:decorative xmlns:adec="http://schemas.microsoft.com/office/drawing/2017/decorative" val="1"/>
-              </a:ext>
-            </a:extLst>
-          </p:cNvPr>
-          <p:cNvCxnSpPr>
-            <a:cxnSpLocks noGrp="1" noRot="1" noChangeAspect="1" noMove="1" noResize="1" noEditPoints="1" noAdjustHandles="1" noChangeArrowheads="1" noChangeShapeType="1"/>
-          </p:cNvCxnSpPr>
-          <p:nvPr>
-            <p:extLst>
-              <p:ext uri="{386F3935-93C4-4BCD-93E2-E3B085C9AB24}">
-                <p16:designElem xmlns:p16="http://schemas.microsoft.com/office/powerpoint/2015/main" val="1"/>
-              </p:ext>
-            </p:extLst>
-          </p:nvPr>
-        </p:nvCxnSpPr>
-        <p:spPr>
-          <a:xfrm>
-            <a:off x="8956620" y="1573887"/>
-            <a:ext cx="0" cy="3710227"/>
-          </a:xfrm>
-          <a:prstGeom prst="line">
-            <a:avLst/>
-          </a:prstGeom>
-          <a:ln w="19050">
-            <a:solidFill>
-              <a:srgbClr val="7F7F7F"/>
-            </a:solidFill>
-          </a:ln>
-        </p:spPr>
-        <p:style>
-          <a:lnRef idx="1">
-            <a:schemeClr val="accent1"/>
-          </a:lnRef>
-          <a:fillRef idx="0">
-            <a:schemeClr val="accent1"/>
-          </a:fillRef>
-          <a:effectRef idx="0">
-            <a:schemeClr val="accent1"/>
-          </a:effectRef>
-          <a:fontRef idx="minor">
-            <a:schemeClr val="tx1"/>
-          </a:fontRef>
-        </p:style>
-      </p:cxnSp>
-      <p:pic>
-        <p:nvPicPr>
-          <p:cNvPr id="4" name="Picture 3" descr="A screenshot of a cell phone&#10;&#10;AI-generated content may be incorrect.">
-            <a:extLst>
-              <a:ext uri="{FF2B5EF4-FFF2-40B4-BE49-F238E27FC236}">
-                <a16:creationId xmlns:a16="http://schemas.microsoft.com/office/drawing/2014/main" id="{8F5ABCF6-0EF6-5333-7006-796474EF00ED}"/>
-              </a:ext>
-            </a:extLst>
-          </p:cNvPr>
-          <p:cNvPicPr>
-            <a:picLocks noChangeAspect="1"/>
-          </p:cNvPicPr>
-          <p:nvPr/>
-        </p:nvPicPr>
-        <p:blipFill>
-          <a:blip r:embed="rId5"/>
-          <a:stretch>
-            <a:fillRect/>
-          </a:stretch>
-        </p:blipFill>
-        <p:spPr>
-          <a:xfrm>
-            <a:off x="9318694" y="1123527"/>
-            <a:ext cx="2164255" cy="4604800"/>
-          </a:xfrm>
-          <a:prstGeom prst="rect">
-            <a:avLst/>
-          </a:prstGeom>
-        </p:spPr>
-      </p:pic>
+          <p:cNvSpPr>
+            <a:spLocks noGrp="1"/>
+          </p:cNvSpPr>
+          <p:nvPr>
+            <p:ph idx="1"/>
+          </p:nvPr>
+        </p:nvSpPr>
+        <p:spPr/>
+        <p:txBody>
+          <a:bodyPr/>
+          <a:lstStyle/>
+          <a:p>
+            <a:r>
+              <a:rPr lang="en-GB" dirty="0"/>
+              <a:t>-High Fidelity Video-</a:t>
+            </a:r>
+          </a:p>
+        </p:txBody>
+      </p:sp>
     </p:spTree>
     <p:extLst>
       <p:ext uri="{BB962C8B-B14F-4D97-AF65-F5344CB8AC3E}">
-        <p14:creationId xmlns:p14="http://schemas.microsoft.com/office/powerpoint/2010/main" val="2785344944"/>
+        <p14:creationId xmlns:p14="http://schemas.microsoft.com/office/powerpoint/2010/main" val="3490681622"/>
       </p:ext>
     </p:extLst>
   </p:cSld>
@@ -19465,41 +20336,6 @@
 <file path=ppt/slides/slide5.xml><?xml version="1.0" encoding="utf-8"?>
 <p:sld xmlns:a="http://schemas.openxmlformats.org/drawingml/2006/main" xmlns:r="http://schemas.openxmlformats.org/officeDocument/2006/relationships" xmlns:p="http://schemas.openxmlformats.org/presentationml/2006/main">
   <p:cSld>
-    <p:bg>
-      <p:bgPr>
-        <a:gradFill rotWithShape="1">
-          <a:gsLst>
-            <a:gs pos="0">
-              <a:schemeClr val="bg2">
-                <a:tint val="96000"/>
-                <a:shade val="100000"/>
-                <a:hueMod val="92000"/>
-                <a:satMod val="200000"/>
-                <a:lumMod val="128000"/>
-              </a:schemeClr>
-            </a:gs>
-            <a:gs pos="50000">
-              <a:schemeClr val="bg2">
-                <a:shade val="100000"/>
-                <a:hueMod val="100000"/>
-                <a:satMod val="110000"/>
-                <a:lumMod val="130000"/>
-              </a:schemeClr>
-            </a:gs>
-            <a:gs pos="100000">
-              <a:schemeClr val="bg2">
-                <a:shade val="78000"/>
-                <a:hueMod val="118000"/>
-                <a:satMod val="120000"/>
-                <a:lumMod val="69000"/>
-              </a:schemeClr>
-            </a:gs>
-          </a:gsLst>
-          <a:lin ang="2520000" scaled="0"/>
-        </a:gradFill>
-        <a:effectLst/>
-      </p:bgPr>
-    </p:bg>
     <p:spTree>
       <p:nvGrpSpPr>
         <p:cNvPr id="1" name="">
@@ -19520,89 +20356,149 @@
           <a:chExt cx="0" cy="0"/>
         </a:xfrm>
       </p:grpSpPr>
-      <p:sp useBgFill="1">
-        <p:nvSpPr>
-          <p:cNvPr id="1055" name="Rectangle 1054">
+      <p:sp>
+        <p:nvSpPr>
+          <p:cNvPr id="2" name="Title 1">
             <a:extLst>
               <a:ext uri="{FF2B5EF4-FFF2-40B4-BE49-F238E27FC236}">
-                <a16:creationId xmlns:a16="http://schemas.microsoft.com/office/drawing/2014/main" id="{A1698906-F123-49CB-B633-247AC48701BD}"/>
-              </a:ext>
-              <a:ext uri="{C183D7F6-B498-43B3-948B-1728B52AA6E4}">
-                <adec:decorative xmlns:adec="http://schemas.microsoft.com/office/drawing/2017/decorative" val="1"/>
+                <a16:creationId xmlns:a16="http://schemas.microsoft.com/office/drawing/2014/main" id="{6D3E9907-A7FC-9338-4214-49EF9FBED2D2}"/>
               </a:ext>
             </a:extLst>
           </p:cNvPr>
           <p:cNvSpPr>
-            <a:spLocks noGrp="1" noRot="1" noChangeAspect="1" noMove="1" noResize="1" noEditPoints="1" noAdjustHandles="1" noChangeArrowheads="1" noChangeShapeType="1" noTextEdit="1"/>
+            <a:spLocks noGrp="1"/>
           </p:cNvSpPr>
           <p:nvPr>
-            <p:extLst>
-              <p:ext uri="{386F3935-93C4-4BCD-93E2-E3B085C9AB24}">
-                <p16:designElem xmlns:p16="http://schemas.microsoft.com/office/powerpoint/2015/main" val="1"/>
-              </p:ext>
-            </p:extLst>
+            <p:ph type="title"/>
           </p:nvPr>
         </p:nvSpPr>
         <p:spPr>
           <a:xfrm>
-            <a:off x="0" y="-1"/>
-            <a:ext cx="12188824" cy="6858001"/>
-          </a:xfrm>
-          <a:prstGeom prst="rect">
-            <a:avLst/>
-          </a:prstGeom>
-        </p:spPr>
-        <p:style>
-          <a:lnRef idx="2">
-            <a:schemeClr val="accent1">
-              <a:shade val="50000"/>
-            </a:schemeClr>
-          </a:lnRef>
-          <a:fillRef idx="1">
-            <a:schemeClr val="accent1"/>
-          </a:fillRef>
-          <a:effectRef idx="0">
-            <a:schemeClr val="accent1"/>
-          </a:effectRef>
-          <a:fontRef idx="minor">
-            <a:schemeClr val="lt1"/>
-          </a:fontRef>
-        </p:style>
+            <a:off x="680321" y="753228"/>
+            <a:ext cx="4136123" cy="1080938"/>
+          </a:xfrm>
+        </p:spPr>
         <p:txBody>
-          <a:bodyPr rtlCol="0" anchor="ctr"/>
+          <a:bodyPr>
+            <a:normAutofit/>
+          </a:bodyPr>
           <a:lstStyle/>
           <a:p>
-            <a:pPr algn="ctr"/>
-            <a:endParaRPr lang="en-US"/>
+            <a:r>
+              <a:rPr lang="en-GB" sz="2400"/>
+              <a:t>Business Case – Force Field Analysis</a:t>
+            </a:r>
+          </a:p>
+        </p:txBody>
+      </p:sp>
+      <p:sp>
+        <p:nvSpPr>
+          <p:cNvPr id="9" name="Content Placeholder 8">
+            <a:extLst>
+              <a:ext uri="{FF2B5EF4-FFF2-40B4-BE49-F238E27FC236}">
+                <a16:creationId xmlns:a16="http://schemas.microsoft.com/office/drawing/2014/main" id="{97FE6474-995E-58F1-508C-07CD3F69C809}"/>
+              </a:ext>
+            </a:extLst>
+          </p:cNvPr>
+          <p:cNvSpPr>
+            <a:spLocks noGrp="1"/>
+          </p:cNvSpPr>
+          <p:nvPr>
+            <p:ph idx="1"/>
+          </p:nvPr>
+        </p:nvSpPr>
+        <p:spPr>
+          <a:xfrm>
+            <a:off x="680321" y="2336873"/>
+            <a:ext cx="3656289" cy="3599316"/>
+          </a:xfrm>
+        </p:spPr>
+        <p:txBody>
+          <a:bodyPr>
+            <a:normAutofit/>
+          </a:bodyPr>
+          <a:lstStyle/>
+          <a:p>
+            <a:pPr marL="0" indent="0">
+              <a:buNone/>
+            </a:pPr>
+            <a:r>
+              <a:rPr lang="en-US" sz="1300" b="1"/>
+              <a:t>Forces For Change:</a:t>
+            </a:r>
+          </a:p>
+          <a:p>
+            <a:r>
+              <a:rPr lang="en-US" sz="1300"/>
+              <a:t>Improved customer experience – Clear Journey Info</a:t>
+            </a:r>
+          </a:p>
+          <a:p>
+            <a:r>
+              <a:rPr lang="en-US" sz="1300"/>
+              <a:t>Alignment with existing operators (Stagecoach, First Bus)</a:t>
+            </a:r>
+          </a:p>
+          <a:p>
+            <a:r>
+              <a:rPr lang="en-US" sz="1300"/>
+              <a:t>Meeting accessibility requirements</a:t>
+            </a:r>
+          </a:p>
+          <a:p>
+            <a:pPr marL="0" indent="0">
+              <a:buNone/>
+            </a:pPr>
+            <a:r>
+              <a:rPr lang="en-US" sz="1300" b="1"/>
+              <a:t>Forces Against Change:</a:t>
+            </a:r>
+          </a:p>
+          <a:p>
+            <a:r>
+              <a:rPr lang="en-US" sz="1300"/>
+              <a:t>Fixed Budget (£65,000)</a:t>
+            </a:r>
+          </a:p>
+          <a:p>
+            <a:r>
+              <a:rPr lang="en-US" sz="1300"/>
+              <a:t>Short Delivery Timeline (mid-December 2025)</a:t>
+            </a:r>
+          </a:p>
+          <a:p>
+            <a:r>
+              <a:rPr lang="en-US" sz="1300"/>
+              <a:t>Strong competition from established apps</a:t>
+            </a:r>
+          </a:p>
+          <a:p>
+            <a:r>
+              <a:rPr lang="en-US" sz="1300"/>
+              <a:t>Uncertainty about post-launch ownership/maintenance</a:t>
+            </a:r>
+          </a:p>
+          <a:p>
+            <a:endParaRPr lang="en-US" sz="1300"/>
           </a:p>
         </p:txBody>
       </p:sp>
       <p:pic>
         <p:nvPicPr>
-          <p:cNvPr id="1056" name="Picture 1055">
+          <p:cNvPr id="4" name="Picture 3" descr="Force Field Analysis&#10;">
             <a:extLst>
               <a:ext uri="{FF2B5EF4-FFF2-40B4-BE49-F238E27FC236}">
-                <a16:creationId xmlns:a16="http://schemas.microsoft.com/office/drawing/2014/main" id="{12AFB628-1D2A-4F5A-8E9E-2C8E917B59E8}"/>
-              </a:ext>
-              <a:ext uri="{C183D7F6-B498-43B3-948B-1728B52AA6E4}">
-                <adec:decorative xmlns:adec="http://schemas.microsoft.com/office/drawing/2017/decorative" val="1"/>
+                <a16:creationId xmlns:a16="http://schemas.microsoft.com/office/drawing/2014/main" id="{42FBC8B5-40E3-286B-4BBB-182EB797CB7A}"/>
               </a:ext>
             </a:extLst>
           </p:cNvPr>
           <p:cNvPicPr>
-            <a:picLocks noGrp="1" noRot="1" noChangeAspect="1" noMove="1" noResize="1" noEditPoints="1" noAdjustHandles="1" noChangeArrowheads="1" noChangeShapeType="1" noCrop="1"/>
+            <a:picLocks noChangeAspect="1"/>
           </p:cNvPicPr>
-          <p:nvPr>
-            <p:extLst>
-              <p:ext uri="{386F3935-93C4-4BCD-93E2-E3B085C9AB24}">
-                <p16:designElem xmlns:p16="http://schemas.microsoft.com/office/powerpoint/2015/main" val="1"/>
-              </p:ext>
-            </p:extLst>
-          </p:nvPr>
+          <p:nvPr/>
         </p:nvPicPr>
         <p:blipFill>
           <a:blip r:embed="rId3">
-            <a:alphaModFix amt="10000"/>
             <a:extLst>
               <a:ext uri="{28A0092B-C50C-407E-A947-70E740481C1C}">
                 <a14:useLocalDpi xmlns:a14="http://schemas.microsoft.com/office/drawing/2010/main" val="0"/>
@@ -19615,41 +20511,8 @@
         </p:blipFill>
         <p:spPr>
           <a:xfrm>
-            <a:off x="-3176" y="0"/>
-            <a:ext cx="12192000" cy="6858000"/>
-          </a:xfrm>
-          <a:prstGeom prst="rect">
-            <a:avLst/>
-          </a:prstGeom>
-        </p:spPr>
-      </p:pic>
-      <p:sp>
-        <p:nvSpPr>
-          <p:cNvPr id="1057" name="Rectangle 1056">
-            <a:extLst>
-              <a:ext uri="{FF2B5EF4-FFF2-40B4-BE49-F238E27FC236}">
-                <a16:creationId xmlns:a16="http://schemas.microsoft.com/office/drawing/2014/main" id="{5D86D9DA-31E3-48ED-9F77-2D8B649BD4E0}"/>
-              </a:ext>
-              <a:ext uri="{C183D7F6-B498-43B3-948B-1728B52AA6E4}">
-                <adec:decorative xmlns:adec="http://schemas.microsoft.com/office/drawing/2017/decorative" val="1"/>
-              </a:ext>
-            </a:extLst>
-          </p:cNvPr>
-          <p:cNvSpPr>
-            <a:spLocks noGrp="1" noRot="1" noChangeAspect="1" noMove="1" noResize="1" noEditPoints="1" noAdjustHandles="1" noChangeArrowheads="1" noChangeShapeType="1" noTextEdit="1"/>
-          </p:cNvSpPr>
-          <p:nvPr>
-            <p:extLst>
-              <p:ext uri="{386F3935-93C4-4BCD-93E2-E3B085C9AB24}">
-                <p16:designElem xmlns:p16="http://schemas.microsoft.com/office/powerpoint/2015/main" val="1"/>
-              </p:ext>
-            </p:extLst>
-          </p:nvPr>
-        </p:nvSpPr>
-        <p:spPr>
-          <a:xfrm>
-            <a:off x="6096000" y="0"/>
-            <a:ext cx="6096000" cy="6858001"/>
+            <a:off x="5513250" y="640080"/>
+            <a:ext cx="5795158" cy="5577840"/>
           </a:xfrm>
           <a:prstGeom prst="rect">
             <a:avLst/>
@@ -19657,413 +20520,19 @@
           <a:ln>
             <a:noFill/>
           </a:ln>
-        </p:spPr>
-        <p:style>
-          <a:lnRef idx="2">
-            <a:schemeClr val="accent1">
-              <a:shade val="50000"/>
-            </a:schemeClr>
-          </a:lnRef>
-          <a:fillRef idx="1">
-            <a:schemeClr val="accent1"/>
-          </a:fillRef>
-          <a:effectRef idx="0">
-            <a:schemeClr val="accent1"/>
-          </a:effectRef>
-          <a:fontRef idx="minor">
-            <a:schemeClr val="lt1"/>
-          </a:fontRef>
-        </p:style>
-        <p:txBody>
-          <a:bodyPr rtlCol="0" anchor="ctr"/>
-          <a:lstStyle/>
-          <a:p>
-            <a:pPr algn="ctr"/>
-            <a:endParaRPr lang="en-US"/>
-          </a:p>
-        </p:txBody>
-      </p:sp>
-      <p:sp>
-        <p:nvSpPr>
-          <p:cNvPr id="1058" name="Rectangle 1057">
-            <a:extLst>
-              <a:ext uri="{FF2B5EF4-FFF2-40B4-BE49-F238E27FC236}">
-                <a16:creationId xmlns:a16="http://schemas.microsoft.com/office/drawing/2014/main" id="{04C6B320-AA89-4C19-89F7-71D46B26BA6B}"/>
-              </a:ext>
-              <a:ext uri="{C183D7F6-B498-43B3-948B-1728B52AA6E4}">
-                <adec:decorative xmlns:adec="http://schemas.microsoft.com/office/drawing/2017/decorative" val="1"/>
-              </a:ext>
-            </a:extLst>
-          </p:cNvPr>
-          <p:cNvSpPr>
-            <a:spLocks noGrp="1" noRot="1" noChangeAspect="1" noMove="1" noResize="1" noEditPoints="1" noAdjustHandles="1" noChangeArrowheads="1" noChangeShapeType="1" noTextEdit="1"/>
-          </p:cNvSpPr>
-          <p:nvPr>
-            <p:extLst>
-              <p:ext uri="{386F3935-93C4-4BCD-93E2-E3B085C9AB24}">
-                <p16:designElem xmlns:p16="http://schemas.microsoft.com/office/powerpoint/2015/main" val="1"/>
-              </p:ext>
-            </p:extLst>
-          </p:nvPr>
-        </p:nvSpPr>
-        <p:spPr bwMode="grayWhite">
-          <a:xfrm>
-            <a:off x="2" y="609600"/>
-            <a:ext cx="6412862" cy="1368198"/>
-          </a:xfrm>
-          <a:prstGeom prst="rect">
-            <a:avLst/>
-          </a:prstGeom>
-          <a:solidFill>
-            <a:schemeClr val="bg1">
-              <a:lumMod val="85000"/>
-              <a:lumOff val="15000"/>
-            </a:schemeClr>
-          </a:solidFill>
-          <a:ln>
-            <a:noFill/>
-          </a:ln>
-        </p:spPr>
-        <p:style>
-          <a:lnRef idx="2">
-            <a:schemeClr val="accent1">
-              <a:shade val="50000"/>
-            </a:schemeClr>
-          </a:lnRef>
-          <a:fillRef idx="1">
-            <a:schemeClr val="accent1"/>
-          </a:fillRef>
-          <a:effectRef idx="0">
-            <a:schemeClr val="accent1"/>
-          </a:effectRef>
-          <a:fontRef idx="minor">
-            <a:schemeClr val="lt1"/>
-          </a:fontRef>
-        </p:style>
-        <p:txBody>
-          <a:bodyPr/>
-          <a:lstStyle/>
-          <a:p>
-            <a:endParaRPr lang="en-GB"/>
-          </a:p>
-        </p:txBody>
-      </p:sp>
-      <p:sp>
-        <p:nvSpPr>
-          <p:cNvPr id="2" name="Title 1">
-            <a:extLst>
-              <a:ext uri="{FF2B5EF4-FFF2-40B4-BE49-F238E27FC236}">
-                <a16:creationId xmlns:a16="http://schemas.microsoft.com/office/drawing/2014/main" id="{6D3E9907-A7FC-9338-4214-49EF9FBED2D2}"/>
-              </a:ext>
-            </a:extLst>
-          </p:cNvPr>
-          <p:cNvSpPr>
-            <a:spLocks noGrp="1"/>
-          </p:cNvSpPr>
-          <p:nvPr>
-            <p:ph type="title"/>
-          </p:nvPr>
-        </p:nvSpPr>
-        <p:spPr>
-          <a:xfrm>
-            <a:off x="680321" y="753228"/>
-            <a:ext cx="5584677" cy="1080938"/>
-          </a:xfrm>
-        </p:spPr>
-        <p:txBody>
-          <a:bodyPr>
-            <a:normAutofit/>
-          </a:bodyPr>
-          <a:lstStyle/>
-          <a:p>
-            <a:r>
-              <a:rPr lang="en-GB"/>
-              <a:t>Business Case – Force Field Analysis</a:t>
-            </a:r>
-          </a:p>
-        </p:txBody>
-      </p:sp>
-      <p:pic>
-        <p:nvPicPr>
-          <p:cNvPr id="1059" name="Picture 1058">
-            <a:extLst>
-              <a:ext uri="{FF2B5EF4-FFF2-40B4-BE49-F238E27FC236}">
-                <a16:creationId xmlns:a16="http://schemas.microsoft.com/office/drawing/2014/main" id="{4AC1383A-2DFB-422E-8FB2-1CABD96DDF9B}"/>
-              </a:ext>
-              <a:ext uri="{C183D7F6-B498-43B3-948B-1728B52AA6E4}">
-                <adec:decorative xmlns:adec="http://schemas.microsoft.com/office/drawing/2017/decorative" val="1"/>
-              </a:ext>
-            </a:extLst>
-          </p:cNvPr>
-          <p:cNvPicPr>
-            <a:picLocks noGrp="1" noRot="1" noChangeAspect="1" noMove="1" noResize="1" noEditPoints="1" noAdjustHandles="1" noChangeArrowheads="1" noChangeShapeType="1" noCrop="1"/>
-          </p:cNvPicPr>
-          <p:nvPr>
-            <p:extLst>
-              <p:ext uri="{386F3935-93C4-4BCD-93E2-E3B085C9AB24}">
-                <p16:designElem xmlns:p16="http://schemas.microsoft.com/office/powerpoint/2015/main" val="1"/>
-              </p:ext>
-            </p:extLst>
-          </p:nvPr>
-        </p:nvPicPr>
-        <p:blipFill>
-          <a:blip r:embed="rId4">
-            <a:extLst>
-              <a:ext uri="{28A0092B-C50C-407E-A947-70E740481C1C}">
-                <a14:useLocalDpi xmlns:a14="http://schemas.microsoft.com/office/drawing/2010/main" val="0"/>
-              </a:ext>
-            </a:extLst>
-          </a:blip>
-          <a:stretch>
-            <a:fillRect/>
-          </a:stretch>
-        </p:blipFill>
-        <p:spPr>
-          <a:xfrm>
-            <a:off x="2" y="1970241"/>
-            <a:ext cx="6409944" cy="258395"/>
-          </a:xfrm>
-          <a:prstGeom prst="rect">
-            <a:avLst/>
-          </a:prstGeom>
-        </p:spPr>
-      </p:pic>
-      <p:sp>
-        <p:nvSpPr>
-          <p:cNvPr id="9" name="Content Placeholder 8">
-            <a:extLst>
-              <a:ext uri="{FF2B5EF4-FFF2-40B4-BE49-F238E27FC236}">
-                <a16:creationId xmlns:a16="http://schemas.microsoft.com/office/drawing/2014/main" id="{97FE6474-995E-58F1-508C-07CD3F69C809}"/>
-              </a:ext>
-            </a:extLst>
-          </p:cNvPr>
-          <p:cNvSpPr>
-            <a:spLocks noGrp="1"/>
-          </p:cNvSpPr>
-          <p:nvPr>
-            <p:ph idx="1"/>
-          </p:nvPr>
-        </p:nvSpPr>
-        <p:spPr>
-          <a:xfrm>
-            <a:off x="680321" y="2336873"/>
-            <a:ext cx="5104843" cy="3599316"/>
-          </a:xfrm>
-        </p:spPr>
-        <p:txBody>
-          <a:bodyPr>
-            <a:normAutofit/>
-          </a:bodyPr>
-          <a:lstStyle/>
-          <a:p>
-            <a:pPr marL="0" indent="0">
-              <a:buNone/>
-            </a:pPr>
-            <a:r>
-              <a:rPr lang="en-US" sz="1600" dirty="0"/>
-              <a:t>Forces for Change : </a:t>
-            </a:r>
-            <a:r>
-              <a:rPr lang="en-US" sz="1600" b="1" dirty="0"/>
-              <a:t>20 | </a:t>
-            </a:r>
-            <a:r>
-              <a:rPr lang="en-US" sz="1600" dirty="0"/>
-              <a:t>Forces Against change : </a:t>
-            </a:r>
-            <a:r>
-              <a:rPr lang="en-US" sz="1600" b="1" dirty="0"/>
-              <a:t>12</a:t>
-            </a:r>
-          </a:p>
-          <a:p>
-            <a:pPr marL="0" indent="0">
-              <a:buNone/>
-            </a:pPr>
-            <a:r>
-              <a:rPr lang="en-US" sz="1400" b="1" dirty="0"/>
-              <a:t>Forces For Change:</a:t>
-            </a:r>
-          </a:p>
-          <a:p>
-            <a:r>
-              <a:rPr lang="en-US" sz="1400" dirty="0"/>
-              <a:t>Improved customer experience – Clear Journey Info</a:t>
-            </a:r>
-          </a:p>
-          <a:p>
-            <a:r>
-              <a:rPr lang="en-US" sz="1400" dirty="0"/>
-              <a:t>Alignment with existing operators (Stagecoach, First Bus)</a:t>
-            </a:r>
-          </a:p>
-          <a:p>
-            <a:r>
-              <a:rPr lang="en-US" sz="1400" dirty="0"/>
-              <a:t>Meeting accessibility requirements</a:t>
-            </a:r>
-          </a:p>
-          <a:p>
-            <a:pPr marL="0" indent="0">
-              <a:buNone/>
-            </a:pPr>
-            <a:r>
-              <a:rPr lang="en-US" sz="1400" b="1" dirty="0"/>
-              <a:t>Forces Against Change:</a:t>
-            </a:r>
-          </a:p>
-          <a:p>
-            <a:r>
-              <a:rPr lang="en-US" sz="1400" dirty="0"/>
-              <a:t>Fixed Budget (£65,000)</a:t>
-            </a:r>
-          </a:p>
-          <a:p>
-            <a:r>
-              <a:rPr lang="en-US" sz="1400" dirty="0"/>
-              <a:t>Short Delivery Timeline (mid-December 2025)</a:t>
-            </a:r>
-          </a:p>
-          <a:p>
-            <a:r>
-              <a:rPr lang="en-US" sz="1400" dirty="0"/>
-              <a:t>Strong competition from established apps</a:t>
-            </a:r>
-          </a:p>
-          <a:p>
-            <a:r>
-              <a:rPr lang="en-US" sz="1400" dirty="0"/>
-              <a:t>Uncertainty about post-launch ownership/maintenance</a:t>
-            </a:r>
-          </a:p>
-          <a:p>
-            <a:endParaRPr lang="en-US" sz="1400" dirty="0"/>
-          </a:p>
-        </p:txBody>
-      </p:sp>
-      <p:sp>
-        <p:nvSpPr>
-          <p:cNvPr id="1054" name="Rectangle 1053">
-            <a:extLst>
-              <a:ext uri="{FF2B5EF4-FFF2-40B4-BE49-F238E27FC236}">
-                <a16:creationId xmlns:a16="http://schemas.microsoft.com/office/drawing/2014/main" id="{645EE119-0AC6-45BA-AE5E-A86AFE1C74C0}"/>
-              </a:ext>
-              <a:ext uri="{C183D7F6-B498-43B3-948B-1728B52AA6E4}">
-                <adec:decorative xmlns:adec="http://schemas.microsoft.com/office/drawing/2017/decorative" val="1"/>
-              </a:ext>
-            </a:extLst>
-          </p:cNvPr>
-          <p:cNvSpPr>
-            <a:spLocks noGrp="1" noRot="1" noChangeAspect="1" noMove="1" noResize="1" noEditPoints="1" noAdjustHandles="1" noChangeArrowheads="1" noChangeShapeType="1" noTextEdit="1"/>
-          </p:cNvSpPr>
-          <p:nvPr>
-            <p:extLst>
-              <p:ext uri="{386F3935-93C4-4BCD-93E2-E3B085C9AB24}">
-                <p16:designElem xmlns:p16="http://schemas.microsoft.com/office/powerpoint/2015/main" val="1"/>
-              </p:ext>
-            </p:extLst>
-          </p:nvPr>
-        </p:nvSpPr>
-        <p:spPr>
-          <a:xfrm>
-            <a:off x="6733163" y="642795"/>
-            <a:ext cx="4812406" cy="5575125"/>
-          </a:xfrm>
-          <a:prstGeom prst="rect">
-            <a:avLst/>
-          </a:prstGeom>
-          <a:solidFill>
-            <a:schemeClr val="tx1"/>
-          </a:solidFill>
-          <a:ln>
-            <a:noFill/>
-          </a:ln>
           <a:effectLst>
-            <a:outerShdw blurRad="76200" dist="63500" dir="5040000" algn="t" rotWithShape="0">
-              <a:prstClr val="black">
+            <a:outerShdw blurRad="76200" dist="63500" dir="5040000" algn="tl" rotWithShape="0">
+              <a:srgbClr val="000000">
                 <a:alpha val="41000"/>
-              </a:prstClr>
+              </a:srgbClr>
             </a:outerShdw>
           </a:effectLst>
-        </p:spPr>
-        <p:style>
-          <a:lnRef idx="2">
-            <a:schemeClr val="accent1">
-              <a:shade val="50000"/>
-            </a:schemeClr>
-          </a:lnRef>
-          <a:fillRef idx="1">
-            <a:schemeClr val="accent1"/>
-          </a:fillRef>
-          <a:effectRef idx="0">
-            <a:schemeClr val="accent1"/>
-          </a:effectRef>
-          <a:fontRef idx="minor">
-            <a:schemeClr val="lt1"/>
-          </a:fontRef>
-        </p:style>
-        <p:txBody>
-          <a:bodyPr rtlCol="0" anchor="ctr"/>
-          <a:lstStyle/>
-          <a:p>
-            <a:pPr algn="ctr"/>
-            <a:endParaRPr lang="en-US"/>
-          </a:p>
-        </p:txBody>
-      </p:sp>
-      <p:pic>
-        <p:nvPicPr>
-          <p:cNvPr id="1026" name="Picture 2">
-            <a:extLst>
-              <a:ext uri="{FF2B5EF4-FFF2-40B4-BE49-F238E27FC236}">
-                <a16:creationId xmlns:a16="http://schemas.microsoft.com/office/drawing/2014/main" id="{BFF2B3BF-97E3-C8A2-EF63-1452D7A5748B}"/>
-              </a:ext>
-            </a:extLst>
-          </p:cNvPr>
-          <p:cNvPicPr>
-            <a:picLocks noChangeAspect="1" noChangeArrowheads="1"/>
-          </p:cNvPicPr>
-          <p:nvPr/>
-        </p:nvPicPr>
-        <p:blipFill>
-          <a:blip r:embed="rId5">
-            <a:extLst>
-              <a:ext uri="{28A0092B-C50C-407E-A947-70E740481C1C}">
-                <a14:useLocalDpi xmlns:a14="http://schemas.microsoft.com/office/drawing/2010/main" val="0"/>
-              </a:ext>
-            </a:extLst>
-          </a:blip>
-          <a:srcRect/>
-          <a:stretch/>
-        </p:blipFill>
-        <p:spPr bwMode="auto">
-          <a:xfrm>
-            <a:off x="6729987" y="1024574"/>
-            <a:ext cx="4685601" cy="4690426"/>
-          </a:xfrm>
-          <a:prstGeom prst="rect">
-            <a:avLst/>
-          </a:prstGeom>
-          <a:noFill/>
-          <a:ln>
-            <a:noFill/>
-          </a:ln>
-          <a:effectLst/>
-          <a:extLst>
-            <a:ext uri="{909E8E84-426E-40DD-AFC4-6F175D3DCCD1}">
-              <a14:hiddenFill xmlns:a14="http://schemas.microsoft.com/office/drawing/2010/main">
-                <a:solidFill>
-                  <a:srgbClr val="FFFFFF"/>
-                </a:solidFill>
-              </a14:hiddenFill>
-            </a:ext>
-          </a:extLst>
         </p:spPr>
       </p:pic>
     </p:spTree>
     <p:extLst>
       <p:ext uri="{BB962C8B-B14F-4D97-AF65-F5344CB8AC3E}">
-        <p14:creationId xmlns:p14="http://schemas.microsoft.com/office/powerpoint/2010/main" val="82146432"/>
+        <p14:creationId xmlns:p14="http://schemas.microsoft.com/office/powerpoint/2010/main" val="3143916376"/>
       </p:ext>
     </p:extLst>
   </p:cSld>
@@ -20566,7 +21035,7 @@
           <p:nvPr>
             <p:extLst>
               <p:ext uri="{D42A27DB-BD31-4B8C-83A1-F6EECF244321}">
-                <p14:modId xmlns:p14="http://schemas.microsoft.com/office/powerpoint/2010/main" val="3375051621"/>
+                <p14:modId xmlns:p14="http://schemas.microsoft.com/office/powerpoint/2010/main" val="810013472"/>
               </p:ext>
             </p:extLst>
           </p:nvPr>
@@ -20597,41 +21066,6 @@
 <file path=ppt/slides/slide7.xml><?xml version="1.0" encoding="utf-8"?>
 <p:sld xmlns:a="http://schemas.openxmlformats.org/drawingml/2006/main" xmlns:r="http://schemas.openxmlformats.org/officeDocument/2006/relationships" xmlns:p="http://schemas.openxmlformats.org/presentationml/2006/main">
   <p:cSld>
-    <p:bg>
-      <p:bgPr>
-        <a:gradFill rotWithShape="1">
-          <a:gsLst>
-            <a:gs pos="0">
-              <a:schemeClr val="bg2">
-                <a:tint val="96000"/>
-                <a:shade val="100000"/>
-                <a:hueMod val="92000"/>
-                <a:satMod val="200000"/>
-                <a:lumMod val="128000"/>
-              </a:schemeClr>
-            </a:gs>
-            <a:gs pos="50000">
-              <a:schemeClr val="bg2">
-                <a:shade val="100000"/>
-                <a:hueMod val="100000"/>
-                <a:satMod val="110000"/>
-                <a:lumMod val="130000"/>
-              </a:schemeClr>
-            </a:gs>
-            <a:gs pos="100000">
-              <a:schemeClr val="bg2">
-                <a:shade val="78000"/>
-                <a:hueMod val="118000"/>
-                <a:satMod val="120000"/>
-                <a:lumMod val="69000"/>
-              </a:schemeClr>
-            </a:gs>
-          </a:gsLst>
-          <a:lin ang="2520000" scaled="0"/>
-        </a:gradFill>
-        <a:effectLst/>
-      </p:bgPr>
-    </p:bg>
     <p:spTree>
       <p:nvGrpSpPr>
         <p:cNvPr id="1" name="">
@@ -20652,234 +21086,6 @@
           <a:chExt cx="0" cy="0"/>
         </a:xfrm>
       </p:grpSpPr>
-      <p:sp useBgFill="1">
-        <p:nvSpPr>
-          <p:cNvPr id="27" name="Rectangle 26">
-            <a:extLst>
-              <a:ext uri="{FF2B5EF4-FFF2-40B4-BE49-F238E27FC236}">
-                <a16:creationId xmlns:a16="http://schemas.microsoft.com/office/drawing/2014/main" id="{8DCA3673-CDE4-40C5-9FA8-F89874CFBA73}"/>
-              </a:ext>
-              <a:ext uri="{C183D7F6-B498-43B3-948B-1728B52AA6E4}">
-                <adec:decorative xmlns:adec="http://schemas.microsoft.com/office/drawing/2017/decorative" val="1"/>
-              </a:ext>
-            </a:extLst>
-          </p:cNvPr>
-          <p:cNvSpPr>
-            <a:spLocks noGrp="1" noRot="1" noChangeAspect="1" noMove="1" noResize="1" noEditPoints="1" noAdjustHandles="1" noChangeArrowheads="1" noChangeShapeType="1" noTextEdit="1"/>
-          </p:cNvSpPr>
-          <p:nvPr>
-            <p:extLst>
-              <p:ext uri="{386F3935-93C4-4BCD-93E2-E3B085C9AB24}">
-                <p16:designElem xmlns:p16="http://schemas.microsoft.com/office/powerpoint/2015/main" val="1"/>
-              </p:ext>
-            </p:extLst>
-          </p:nvPr>
-        </p:nvSpPr>
-        <p:spPr>
-          <a:xfrm>
-            <a:off x="0" y="-1"/>
-            <a:ext cx="12188824" cy="6858001"/>
-          </a:xfrm>
-          <a:prstGeom prst="rect">
-            <a:avLst/>
-          </a:prstGeom>
-        </p:spPr>
-        <p:style>
-          <a:lnRef idx="2">
-            <a:schemeClr val="accent1">
-              <a:shade val="50000"/>
-            </a:schemeClr>
-          </a:lnRef>
-          <a:fillRef idx="1">
-            <a:schemeClr val="accent1"/>
-          </a:fillRef>
-          <a:effectRef idx="0">
-            <a:schemeClr val="accent1"/>
-          </a:effectRef>
-          <a:fontRef idx="minor">
-            <a:schemeClr val="lt1"/>
-          </a:fontRef>
-        </p:style>
-        <p:txBody>
-          <a:bodyPr rtlCol="0" anchor="ctr"/>
-          <a:lstStyle/>
-          <a:p>
-            <a:pPr algn="ctr"/>
-            <a:endParaRPr lang="en-US"/>
-          </a:p>
-        </p:txBody>
-      </p:sp>
-      <p:pic>
-        <p:nvPicPr>
-          <p:cNvPr id="29" name="Picture 28">
-            <a:extLst>
-              <a:ext uri="{FF2B5EF4-FFF2-40B4-BE49-F238E27FC236}">
-                <a16:creationId xmlns:a16="http://schemas.microsoft.com/office/drawing/2014/main" id="{95756E8F-499C-4533-BBE8-309C3E8D985C}"/>
-              </a:ext>
-              <a:ext uri="{C183D7F6-B498-43B3-948B-1728B52AA6E4}">
-                <adec:decorative xmlns:adec="http://schemas.microsoft.com/office/drawing/2017/decorative" val="1"/>
-              </a:ext>
-            </a:extLst>
-          </p:cNvPr>
-          <p:cNvPicPr>
-            <a:picLocks noGrp="1" noRot="1" noChangeAspect="1" noMove="1" noResize="1" noEditPoints="1" noAdjustHandles="1" noChangeArrowheads="1" noChangeShapeType="1" noCrop="1"/>
-          </p:cNvPicPr>
-          <p:nvPr>
-            <p:extLst>
-              <p:ext uri="{386F3935-93C4-4BCD-93E2-E3B085C9AB24}">
-                <p16:designElem xmlns:p16="http://schemas.microsoft.com/office/powerpoint/2015/main" val="1"/>
-              </p:ext>
-            </p:extLst>
-          </p:nvPr>
-        </p:nvPicPr>
-        <p:blipFill>
-          <a:blip r:embed="rId3">
-            <a:alphaModFix amt="10000"/>
-            <a:extLst>
-              <a:ext uri="{28A0092B-C50C-407E-A947-70E740481C1C}">
-                <a14:useLocalDpi xmlns:a14="http://schemas.microsoft.com/office/drawing/2010/main" val="0"/>
-              </a:ext>
-            </a:extLst>
-          </a:blip>
-          <a:stretch>
-            <a:fillRect/>
-          </a:stretch>
-        </p:blipFill>
-        <p:spPr>
-          <a:xfrm>
-            <a:off x="-3176" y="0"/>
-            <a:ext cx="12192000" cy="6858000"/>
-          </a:xfrm>
-          <a:prstGeom prst="rect">
-            <a:avLst/>
-          </a:prstGeom>
-        </p:spPr>
-      </p:pic>
-      <p:sp>
-        <p:nvSpPr>
-          <p:cNvPr id="31" name="Rectangle 30">
-            <a:extLst>
-              <a:ext uri="{FF2B5EF4-FFF2-40B4-BE49-F238E27FC236}">
-                <a16:creationId xmlns:a16="http://schemas.microsoft.com/office/drawing/2014/main" id="{0FFFD040-32A9-4D2B-86CA-599D030A4161}"/>
-              </a:ext>
-              <a:ext uri="{C183D7F6-B498-43B3-948B-1728B52AA6E4}">
-                <adec:decorative xmlns:adec="http://schemas.microsoft.com/office/drawing/2017/decorative" val="1"/>
-              </a:ext>
-            </a:extLst>
-          </p:cNvPr>
-          <p:cNvSpPr>
-            <a:spLocks noGrp="1" noRot="1" noChangeAspect="1" noMove="1" noResize="1" noEditPoints="1" noAdjustHandles="1" noChangeArrowheads="1" noChangeShapeType="1" noTextEdit="1"/>
-          </p:cNvSpPr>
-          <p:nvPr>
-            <p:extLst>
-              <p:ext uri="{386F3935-93C4-4BCD-93E2-E3B085C9AB24}">
-                <p16:designElem xmlns:p16="http://schemas.microsoft.com/office/powerpoint/2015/main" val="1"/>
-              </p:ext>
-            </p:extLst>
-          </p:nvPr>
-        </p:nvSpPr>
-        <p:spPr>
-          <a:xfrm>
-            <a:off x="4639056" y="0"/>
-            <a:ext cx="7552944" cy="6858001"/>
-          </a:xfrm>
-          <a:prstGeom prst="rect">
-            <a:avLst/>
-          </a:prstGeom>
-          <a:ln>
-            <a:noFill/>
-          </a:ln>
-        </p:spPr>
-        <p:style>
-          <a:lnRef idx="2">
-            <a:schemeClr val="accent1">
-              <a:shade val="50000"/>
-            </a:schemeClr>
-          </a:lnRef>
-          <a:fillRef idx="1">
-            <a:schemeClr val="accent1"/>
-          </a:fillRef>
-          <a:effectRef idx="0">
-            <a:schemeClr val="accent1"/>
-          </a:effectRef>
-          <a:fontRef idx="minor">
-            <a:schemeClr val="lt1"/>
-          </a:fontRef>
-        </p:style>
-        <p:txBody>
-          <a:bodyPr rtlCol="0" anchor="ctr"/>
-          <a:lstStyle/>
-          <a:p>
-            <a:pPr algn="ctr"/>
-            <a:endParaRPr lang="en-US"/>
-          </a:p>
-        </p:txBody>
-      </p:sp>
-      <p:sp>
-        <p:nvSpPr>
-          <p:cNvPr id="33" name="Rectangle 32">
-            <a:extLst>
-              <a:ext uri="{FF2B5EF4-FFF2-40B4-BE49-F238E27FC236}">
-                <a16:creationId xmlns:a16="http://schemas.microsoft.com/office/drawing/2014/main" id="{863205CA-B7FF-4C25-A4C8-3BBBCE19D950}"/>
-              </a:ext>
-              <a:ext uri="{C183D7F6-B498-43B3-948B-1728B52AA6E4}">
-                <adec:decorative xmlns:adec="http://schemas.microsoft.com/office/drawing/2017/decorative" val="1"/>
-              </a:ext>
-            </a:extLst>
-          </p:cNvPr>
-          <p:cNvSpPr>
-            <a:spLocks noGrp="1" noRot="1" noChangeAspect="1" noMove="1" noResize="1" noEditPoints="1" noAdjustHandles="1" noChangeArrowheads="1" noChangeShapeType="1" noTextEdit="1"/>
-          </p:cNvSpPr>
-          <p:nvPr>
-            <p:extLst>
-              <p:ext uri="{386F3935-93C4-4BCD-93E2-E3B085C9AB24}">
-                <p16:designElem xmlns:p16="http://schemas.microsoft.com/office/powerpoint/2015/main" val="1"/>
-              </p:ext>
-            </p:extLst>
-          </p:nvPr>
-        </p:nvSpPr>
-        <p:spPr bwMode="grayWhite">
-          <a:xfrm>
-            <a:off x="2" y="609600"/>
-            <a:ext cx="4959094" cy="1368198"/>
-          </a:xfrm>
-          <a:prstGeom prst="rect">
-            <a:avLst/>
-          </a:prstGeom>
-          <a:solidFill>
-            <a:schemeClr val="bg1">
-              <a:lumMod val="85000"/>
-              <a:lumOff val="15000"/>
-            </a:schemeClr>
-          </a:solidFill>
-          <a:ln>
-            <a:noFill/>
-          </a:ln>
-        </p:spPr>
-        <p:style>
-          <a:lnRef idx="2">
-            <a:schemeClr val="accent1">
-              <a:shade val="50000"/>
-            </a:schemeClr>
-          </a:lnRef>
-          <a:fillRef idx="1">
-            <a:schemeClr val="accent1"/>
-          </a:fillRef>
-          <a:effectRef idx="0">
-            <a:schemeClr val="accent1"/>
-          </a:effectRef>
-          <a:fontRef idx="minor">
-            <a:schemeClr val="lt1"/>
-          </a:fontRef>
-        </p:style>
-        <p:txBody>
-          <a:bodyPr/>
-          <a:lstStyle/>
-          <a:p>
-            <a:endParaRPr lang="en-GB"/>
-          </a:p>
-        </p:txBody>
-      </p:sp>
       <p:sp>
         <p:nvSpPr>
           <p:cNvPr id="2" name="Title 1">
@@ -20915,51 +21121,6 @@
           </a:p>
         </p:txBody>
       </p:sp>
-      <p:pic>
-        <p:nvPicPr>
-          <p:cNvPr id="35" name="Picture 34">
-            <a:extLst>
-              <a:ext uri="{FF2B5EF4-FFF2-40B4-BE49-F238E27FC236}">
-                <a16:creationId xmlns:a16="http://schemas.microsoft.com/office/drawing/2014/main" id="{306E3F32-3C1A-4B6E-AF26-8A15A788560F}"/>
-              </a:ext>
-              <a:ext uri="{C183D7F6-B498-43B3-948B-1728B52AA6E4}">
-                <adec:decorative xmlns:adec="http://schemas.microsoft.com/office/drawing/2017/decorative" val="1"/>
-              </a:ext>
-            </a:extLst>
-          </p:cNvPr>
-          <p:cNvPicPr>
-            <a:picLocks noGrp="1" noRot="1" noChangeAspect="1" noMove="1" noResize="1" noEditPoints="1" noAdjustHandles="1" noChangeArrowheads="1" noChangeShapeType="1" noCrop="1"/>
-          </p:cNvPicPr>
-          <p:nvPr>
-            <p:extLst>
-              <p:ext uri="{386F3935-93C4-4BCD-93E2-E3B085C9AB24}">
-                <p16:designElem xmlns:p16="http://schemas.microsoft.com/office/powerpoint/2015/main" val="1"/>
-              </p:ext>
-            </p:extLst>
-          </p:nvPr>
-        </p:nvPicPr>
-        <p:blipFill>
-          <a:blip r:embed="rId4">
-            <a:extLst>
-              <a:ext uri="{28A0092B-C50C-407E-A947-70E740481C1C}">
-                <a14:useLocalDpi xmlns:a14="http://schemas.microsoft.com/office/drawing/2010/main" val="0"/>
-              </a:ext>
-            </a:extLst>
-          </a:blip>
-          <a:stretch>
-            <a:fillRect/>
-          </a:stretch>
-        </p:blipFill>
-        <p:spPr>
-          <a:xfrm>
-            <a:off x="2" y="1970241"/>
-            <a:ext cx="4956048" cy="199787"/>
-          </a:xfrm>
-          <a:prstGeom prst="rect">
-            <a:avLst/>
-          </a:prstGeom>
-        </p:spPr>
-      </p:pic>
       <p:sp>
         <p:nvSpPr>
           <p:cNvPr id="9" name="Content Placeholder 8">
@@ -20978,13 +21139,13 @@
         </p:nvSpPr>
         <p:spPr>
           <a:xfrm>
-            <a:off x="76201" y="2113873"/>
-            <a:ext cx="4486274" cy="4639352"/>
+            <a:off x="152400" y="2170028"/>
+            <a:ext cx="4320539" cy="4413652"/>
           </a:xfrm>
         </p:spPr>
         <p:txBody>
           <a:bodyPr>
-            <a:normAutofit fontScale="85000" lnSpcReduction="20000"/>
+            <a:normAutofit fontScale="47500" lnSpcReduction="20000"/>
           </a:bodyPr>
           <a:lstStyle/>
           <a:p>
@@ -20992,7 +21153,7 @@
               <a:buNone/>
             </a:pPr>
             <a:r>
-              <a:rPr lang="en-US" sz="1500" b="1" dirty="0"/>
+              <a:rPr lang="en-US" sz="2300" b="1" dirty="0"/>
               <a:t>Costs:</a:t>
             </a:r>
           </a:p>
@@ -21002,21 +21163,21 @@
               <a:buChar char="-"/>
             </a:pPr>
             <a:r>
-              <a:rPr lang="en-US" sz="1500" b="1" dirty="0"/>
+              <a:rPr lang="en-US" sz="2300" b="1" dirty="0"/>
               <a:t>Capital:</a:t>
             </a:r>
           </a:p>
           <a:p>
             <a:pPr lvl="1"/>
             <a:r>
-              <a:rPr lang="en-US" sz="1200" dirty="0"/>
+              <a:rPr lang="en-US" sz="2300" dirty="0"/>
               <a:t>Development: £65,000 (fixed budget)</a:t>
             </a:r>
           </a:p>
           <a:p>
             <a:pPr lvl="1"/>
             <a:r>
-              <a:rPr lang="en-US" sz="1200" dirty="0"/>
+              <a:rPr lang="en-US" sz="2300" dirty="0"/>
               <a:t>Cloud Hosting (Yr 1): £1,200</a:t>
             </a:r>
           </a:p>
@@ -21026,28 +21187,28 @@
               <a:buChar char="-"/>
             </a:pPr>
             <a:r>
-              <a:rPr lang="en-US" sz="1500" b="1" dirty="0"/>
+              <a:rPr lang="en-US" sz="2300" b="1" dirty="0"/>
               <a:t>Recurring (Years 1-5):</a:t>
             </a:r>
           </a:p>
           <a:p>
             <a:pPr lvl="1"/>
             <a:r>
-              <a:rPr lang="en-US" sz="1200" dirty="0"/>
+              <a:rPr lang="en-US" sz="2300" dirty="0"/>
               <a:t>Cloud Hosting Renewal: £1,200/year</a:t>
             </a:r>
           </a:p>
           <a:p>
             <a:pPr lvl="1"/>
             <a:r>
-              <a:rPr lang="en-US" sz="1200" dirty="0"/>
+              <a:rPr lang="en-US" sz="2300" dirty="0"/>
               <a:t>Transport API (Map): £670/year </a:t>
             </a:r>
           </a:p>
           <a:p>
             <a:pPr lvl="1"/>
             <a:r>
-              <a:rPr lang="en-US" sz="1200" dirty="0"/>
+              <a:rPr lang="en-US" sz="2300" dirty="0"/>
               <a:t>Built-in Support/Helpdesk: £2,000/year</a:t>
             </a:r>
           </a:p>
@@ -21056,17 +21217,16 @@
               <a:buNone/>
             </a:pPr>
             <a:r>
-              <a:rPr lang="en-US" sz="1200" dirty="0"/>
+              <a:rPr lang="en-US" sz="2300" dirty="0"/>
               <a:t>Total recurring: £4,000/£5,000/year (grows with inflation)</a:t>
             </a:r>
-            <a:endParaRPr lang="en-US" sz="1700" dirty="0"/>
           </a:p>
           <a:p>
             <a:pPr marL="0" indent="0">
               <a:buNone/>
             </a:pPr>
             <a:r>
-              <a:rPr lang="en-US" sz="1500" b="1" dirty="0"/>
+              <a:rPr lang="en-US" sz="2300" b="1" dirty="0"/>
               <a:t>Benefits:</a:t>
             </a:r>
           </a:p>
@@ -21076,20 +21236,20 @@
               <a:buChar char="-"/>
             </a:pPr>
             <a:r>
-              <a:rPr lang="en-US" sz="1500" b="1" dirty="0"/>
+              <a:rPr lang="en-US" sz="2300" b="1" dirty="0"/>
               <a:t>Revenue Streams: </a:t>
             </a:r>
           </a:p>
           <a:p>
             <a:pPr lvl="1"/>
             <a:r>
-              <a:rPr lang="en-US" sz="1200" dirty="0"/>
+              <a:rPr lang="en-US" sz="2300" dirty="0"/>
               <a:t>Ticket Commissions: £36,000/year (10% on £3 tickets x 10,000 users)</a:t>
             </a:r>
           </a:p>
           <a:p>
             <a:pPr lvl="1"/>
-            <a:endParaRPr lang="en-US" sz="1100" dirty="0"/>
+            <a:endParaRPr lang="en-US" sz="2300" dirty="0"/>
           </a:p>
           <a:p>
             <a:pPr>
@@ -21097,19 +21257,15 @@
               <a:buChar char="-"/>
             </a:pPr>
             <a:r>
-              <a:rPr lang="en-US" sz="1500" b="1" dirty="0"/>
+              <a:rPr lang="en-US" sz="2300" b="1" dirty="0"/>
               <a:t>Cost Savings:</a:t>
             </a:r>
           </a:p>
           <a:p>
             <a:pPr lvl="1"/>
             <a:r>
-              <a:rPr lang="en-US" sz="1100" dirty="0"/>
-              <a:t> </a:t>
-            </a:r>
-            <a:r>
-              <a:rPr lang="en-US" sz="1200" dirty="0"/>
-              <a:t>Faster Boarding: £2,000/year (reduced time stationary leading to lower overtime/fuel costs)</a:t>
+              <a:rPr lang="en-US" sz="2300" dirty="0"/>
+              <a:t> Faster Boarding: £2,000/year (reduced time stationary leading to lower overtime/fuel costs)</a:t>
             </a:r>
           </a:p>
           <a:p>
@@ -21117,51 +21273,59 @@
               <a:buNone/>
             </a:pPr>
             <a:r>
-              <a:rPr lang="en-US" sz="1500" b="1" dirty="0"/>
+              <a:rPr lang="en-US" sz="2300" b="1" dirty="0"/>
               <a:t>Financial Outcome:</a:t>
             </a:r>
           </a:p>
           <a:p>
             <a:r>
-              <a:rPr lang="en-US" sz="1500" dirty="0"/>
+              <a:rPr lang="en-US" sz="2300" dirty="0"/>
               <a:t>Year 1 Loss: £30,000</a:t>
             </a:r>
           </a:p>
           <a:p>
             <a:r>
-              <a:rPr lang="en-US" sz="1500" dirty="0"/>
+              <a:rPr lang="en-US" sz="2300" dirty="0"/>
               <a:t>Year 2-5: Exceeding costs (£34,000-£35,000 annually)</a:t>
             </a:r>
           </a:p>
           <a:p>
             <a:r>
-              <a:rPr lang="en-US" sz="1500" dirty="0"/>
-              <a:t>5-year cumulative return: £109,000 (1.7x ROI)</a:t>
-            </a:r>
-          </a:p>
-          <a:p>
-            <a:endParaRPr lang="en-US" sz="1400" dirty="0"/>
+              <a:rPr lang="en-US" sz="2300" dirty="0"/>
+              <a:t>5-year cumulative return: £110,000 </a:t>
+            </a:r>
+            <a:r>
+              <a:rPr lang="en-US" sz="2300"/>
+              <a:t>(1.7x </a:t>
+            </a:r>
+            <a:r>
+              <a:rPr lang="en-US" sz="2300" dirty="0"/>
+              <a:t>ROI)</a:t>
+            </a:r>
+          </a:p>
+          <a:p>
+            <a:endParaRPr lang="en-US" sz="600" dirty="0"/>
           </a:p>
           <a:p>
             <a:pPr marL="457200" lvl="1" indent="0">
               <a:buNone/>
             </a:pPr>
-            <a:endParaRPr lang="en-US" sz="1000" dirty="0"/>
+            <a:endParaRPr lang="en-US" sz="600" dirty="0"/>
           </a:p>
           <a:p>
             <a:pPr marL="457200" lvl="1" indent="0">
               <a:buNone/>
             </a:pPr>
-            <a:endParaRPr lang="en-US" sz="1000" dirty="0"/>
+            <a:endParaRPr lang="en-US" sz="600" dirty="0"/>
           </a:p>
         </p:txBody>
       </p:sp>
       <p:pic>
         <p:nvPicPr>
-          <p:cNvPr id="4" name="Picture 3" descr="Cost Benefits Analysis">
+          <p:cNvPr id="5" name="Picture 4" descr="A screenshot of a computer&#10;&#10;AI-generated content may be incorrect.">
             <a:extLst>
               <a:ext uri="{FF2B5EF4-FFF2-40B4-BE49-F238E27FC236}">
-                <a16:creationId xmlns:a16="http://schemas.microsoft.com/office/drawing/2014/main" id="{25978EAD-B90C-7FB9-A23F-DB67D1BFBDF5}"/>
+                <a16:creationId xmlns:a16="http://schemas.microsoft.com/office/drawing/2014/main" id="{2692CF08-8CA5-5A4A-45B0-26942D778F74}"/>
               </a:ext>
             </a:extLst>
           </p:cNvPr>
@@ -21171,15 +21335,15 @@
           <p:nvPr/>
         </p:nvPicPr>
         <p:blipFill>
-          <a:blip r:embed="rId5"/>
+          <a:blip r:embed="rId3"/>
           <a:stretch>
             <a:fillRect/>
           </a:stretch>
         </p:blipFill>
         <p:spPr>
           <a:xfrm>
-            <a:off x="4816444" y="2261018"/>
-            <a:ext cx="7187575" cy="2335961"/>
+            <a:off x="4757930" y="2569982"/>
+            <a:ext cx="7325741" cy="1758178"/>
           </a:xfrm>
           <a:prstGeom prst="rect">
             <a:avLst/>
@@ -21199,7 +21363,7 @@
     </p:spTree>
     <p:extLst>
       <p:ext uri="{BB962C8B-B14F-4D97-AF65-F5344CB8AC3E}">
-        <p14:creationId xmlns:p14="http://schemas.microsoft.com/office/powerpoint/2010/main" val="2275718489"/>
+        <p14:creationId xmlns:p14="http://schemas.microsoft.com/office/powerpoint/2010/main" val="3616386197"/>
       </p:ext>
     </p:extLst>
   </p:cSld>

</xml_diff>

<commit_message>
added the updated RACI Matrix and jiro Gantt chart
</commit_message>
<xml_diff>
--- a/SY Bus Journey Planner Presentation.pptx
+++ b/SY Bus Journey Planner Presentation.pptx
@@ -139,35 +139,6 @@
     <p1510:client id="{9D5BF5E5-08F0-4788-93B4-DC36E80752B6}" v="4" dt="2025-12-10T08:43:06.762"/>
   </p1510:revLst>
 </p1510:revInfo>
-</file>
-
-<file path=ppt/changesInfos/changesInfo1.xml><?xml version="1.0" encoding="utf-8"?>
-<pc:chgInfo xmlns:a="http://schemas.openxmlformats.org/drawingml/2006/main" xmlns:r="http://schemas.openxmlformats.org/officeDocument/2006/relationships" xmlns:ac="http://schemas.microsoft.com/office/drawing/2013/main/command" xmlns:pc="http://schemas.microsoft.com/office/powerpoint/2013/main/command">
-  <pc:docChgLst>
-    <pc:chgData name="Moyuwen, Elekir (Student)" userId="4e2a76e3-7167-4ff9-9535-77d49f0af40a" providerId="ADAL" clId="{835B047F-93EB-40CF-83F3-EA1547C8FEF3}"/>
-    <pc:docChg chg="modSld">
-      <pc:chgData name="Moyuwen, Elekir (Student)" userId="4e2a76e3-7167-4ff9-9535-77d49f0af40a" providerId="ADAL" clId="{835B047F-93EB-40CF-83F3-EA1547C8FEF3}" dt="2025-12-10T08:43:10.184" v="18" actId="20577"/>
-      <pc:docMkLst>
-        <pc:docMk/>
-      </pc:docMkLst>
-      <pc:sldChg chg="modSp mod">
-        <pc:chgData name="Moyuwen, Elekir (Student)" userId="4e2a76e3-7167-4ff9-9535-77d49f0af40a" providerId="ADAL" clId="{835B047F-93EB-40CF-83F3-EA1547C8FEF3}" dt="2025-12-10T08:43:10.184" v="18" actId="20577"/>
-        <pc:sldMkLst>
-          <pc:docMk/>
-          <pc:sldMk cId="1646420599" sldId="257"/>
-        </pc:sldMkLst>
-        <pc:graphicFrameChg chg="mod modGraphic">
-          <ac:chgData name="Moyuwen, Elekir (Student)" userId="4e2a76e3-7167-4ff9-9535-77d49f0af40a" providerId="ADAL" clId="{835B047F-93EB-40CF-83F3-EA1547C8FEF3}" dt="2025-12-10T08:43:10.184" v="18" actId="20577"/>
-          <ac:graphicFrameMkLst>
-            <pc:docMk/>
-            <pc:sldMk cId="1646420599" sldId="257"/>
-            <ac:graphicFrameMk id="9" creationId="{B09E5492-2402-6534-9FB4-130696D3D27D}"/>
-          </ac:graphicFrameMkLst>
-        </pc:graphicFrameChg>
-      </pc:sldChg>
-    </pc:docChg>
-  </pc:docChgLst>
-</pc:chgInfo>
 </file>
 
 <file path=ppt/diagrams/colors1.xml><?xml version="1.0" encoding="utf-8"?>
@@ -3493,7 +3464,7 @@
           <a:p>
             <a:fld id="{DDFCF3D4-4B19-40BF-97C8-2490B697FBE7}" type="datetimeFigureOut">
               <a:rPr lang="en-GB" smtClean="0"/>
-              <a:t>10/12/2025</a:t>
+              <a:t>11/12/2025</a:t>
             </a:fld>
             <a:endParaRPr lang="en-GB"/>
           </a:p>
@@ -6208,7 +6179,7 @@
           <a:p>
             <a:fld id="{A8487364-6656-4621-B013-758523783C72}" type="datetimeFigureOut">
               <a:rPr lang="en-GB" smtClean="0"/>
-              <a:t>10/12/2025</a:t>
+              <a:t>11/12/2025</a:t>
             </a:fld>
             <a:endParaRPr lang="en-GB"/>
           </a:p>
@@ -6622,7 +6593,7 @@
           <a:p>
             <a:fld id="{A8487364-6656-4621-B013-758523783C72}" type="datetimeFigureOut">
               <a:rPr lang="en-GB" smtClean="0"/>
-              <a:t>10/12/2025</a:t>
+              <a:t>11/12/2025</a:t>
             </a:fld>
             <a:endParaRPr lang="en-GB"/>
           </a:p>
@@ -6958,7 +6929,7 @@
           <a:p>
             <a:fld id="{A8487364-6656-4621-B013-758523783C72}" type="datetimeFigureOut">
               <a:rPr lang="en-GB" smtClean="0"/>
-              <a:t>10/12/2025</a:t>
+              <a:t>11/12/2025</a:t>
             </a:fld>
             <a:endParaRPr lang="en-GB"/>
           </a:p>
@@ -7363,7 +7334,7 @@
           <a:p>
             <a:fld id="{A8487364-6656-4621-B013-758523783C72}" type="datetimeFigureOut">
               <a:rPr lang="en-GB" smtClean="0"/>
-              <a:t>10/12/2025</a:t>
+              <a:t>11/12/2025</a:t>
             </a:fld>
             <a:endParaRPr lang="en-GB"/>
           </a:p>
@@ -7931,7 +7902,7 @@
           <a:p>
             <a:fld id="{A8487364-6656-4621-B013-758523783C72}" type="datetimeFigureOut">
               <a:rPr lang="en-GB" smtClean="0"/>
-              <a:t>10/12/2025</a:t>
+              <a:t>11/12/2025</a:t>
             </a:fld>
             <a:endParaRPr lang="en-GB"/>
           </a:p>
@@ -8612,7 +8583,7 @@
           <a:p>
             <a:fld id="{A8487364-6656-4621-B013-758523783C72}" type="datetimeFigureOut">
               <a:rPr lang="en-GB" smtClean="0"/>
-              <a:t>10/12/2025</a:t>
+              <a:t>11/12/2025</a:t>
             </a:fld>
             <a:endParaRPr lang="en-GB"/>
           </a:p>
@@ -9525,7 +9496,7 @@
           <a:p>
             <a:fld id="{A8487364-6656-4621-B013-758523783C72}" type="datetimeFigureOut">
               <a:rPr lang="en-GB" smtClean="0"/>
-              <a:t>10/12/2025</a:t>
+              <a:t>11/12/2025</a:t>
             </a:fld>
             <a:endParaRPr lang="en-GB"/>
           </a:p>
@@ -9838,7 +9809,7 @@
           <a:p>
             <a:fld id="{A8487364-6656-4621-B013-758523783C72}" type="datetimeFigureOut">
               <a:rPr lang="en-GB" smtClean="0"/>
-              <a:t>10/12/2025</a:t>
+              <a:t>11/12/2025</a:t>
             </a:fld>
             <a:endParaRPr lang="en-GB"/>
           </a:p>
@@ -10102,7 +10073,7 @@
           <a:p>
             <a:fld id="{A8487364-6656-4621-B013-758523783C72}" type="datetimeFigureOut">
               <a:rPr lang="en-GB" smtClean="0"/>
-              <a:t>10/12/2025</a:t>
+              <a:t>11/12/2025</a:t>
             </a:fld>
             <a:endParaRPr lang="en-GB"/>
           </a:p>
@@ -10439,7 +10410,7 @@
           <a:p>
             <a:fld id="{A8487364-6656-4621-B013-758523783C72}" type="datetimeFigureOut">
               <a:rPr lang="en-GB" smtClean="0"/>
-              <a:t>10/12/2025</a:t>
+              <a:t>11/12/2025</a:t>
             </a:fld>
             <a:endParaRPr lang="en-GB"/>
           </a:p>
@@ -10828,7 +10799,7 @@
           <a:p>
             <a:fld id="{A8487364-6656-4621-B013-758523783C72}" type="datetimeFigureOut">
               <a:rPr lang="en-GB" smtClean="0"/>
-              <a:t>10/12/2025</a:t>
+              <a:t>11/12/2025</a:t>
             </a:fld>
             <a:endParaRPr lang="en-GB"/>
           </a:p>
@@ -11204,7 +11175,7 @@
           <a:p>
             <a:fld id="{A8487364-6656-4621-B013-758523783C72}" type="datetimeFigureOut">
               <a:rPr lang="en-GB" smtClean="0"/>
-              <a:t>10/12/2025</a:t>
+              <a:t>11/12/2025</a:t>
             </a:fld>
             <a:endParaRPr lang="en-GB"/>
           </a:p>
@@ -11710,7 +11681,7 @@
           <a:p>
             <a:fld id="{A8487364-6656-4621-B013-758523783C72}" type="datetimeFigureOut">
               <a:rPr lang="en-GB" smtClean="0"/>
-              <a:t>10/12/2025</a:t>
+              <a:t>11/12/2025</a:t>
             </a:fld>
             <a:endParaRPr lang="en-GB"/>
           </a:p>
@@ -11967,7 +11938,7 @@
           <a:p>
             <a:fld id="{A8487364-6656-4621-B013-758523783C72}" type="datetimeFigureOut">
               <a:rPr lang="en-GB" smtClean="0"/>
-              <a:t>10/12/2025</a:t>
+              <a:t>11/12/2025</a:t>
             </a:fld>
             <a:endParaRPr lang="en-GB"/>
           </a:p>
@@ -12137,7 +12108,7 @@
           <a:p>
             <a:fld id="{A8487364-6656-4621-B013-758523783C72}" type="datetimeFigureOut">
               <a:rPr lang="en-GB" smtClean="0"/>
-              <a:t>10/12/2025</a:t>
+              <a:t>11/12/2025</a:t>
             </a:fld>
             <a:endParaRPr lang="en-GB"/>
           </a:p>
@@ -12527,7 +12498,7 @@
           <a:p>
             <a:fld id="{A8487364-6656-4621-B013-758523783C72}" type="datetimeFigureOut">
               <a:rPr lang="en-GB" smtClean="0"/>
-              <a:t>10/12/2025</a:t>
+              <a:t>11/12/2025</a:t>
             </a:fld>
             <a:endParaRPr lang="en-GB"/>
           </a:p>
@@ -12936,7 +12907,7 @@
           <a:p>
             <a:fld id="{A8487364-6656-4621-B013-758523783C72}" type="datetimeFigureOut">
               <a:rPr lang="en-GB" smtClean="0"/>
-              <a:t>10/12/2025</a:t>
+              <a:t>11/12/2025</a:t>
             </a:fld>
             <a:endParaRPr lang="en-GB"/>
           </a:p>
@@ -13180,7 +13151,7 @@
           <a:p>
             <a:fld id="{A8487364-6656-4621-B013-758523783C72}" type="datetimeFigureOut">
               <a:rPr lang="en-GB" smtClean="0"/>
-              <a:t>10/12/2025</a:t>
+              <a:t>11/12/2025</a:t>
             </a:fld>
             <a:endParaRPr lang="en-GB"/>
           </a:p>
@@ -14852,7 +14823,7 @@
       </p:sp>
       <p:pic>
         <p:nvPicPr>
-          <p:cNvPr id="4" name="Content Placeholder 4" descr="A screenshot of a computer&#10;&#10;AI-generated content may be incorrect.">
+          <p:cNvPr id="4" name="Content Placeholder 4">
             <a:extLst>
               <a:ext uri="{FF2B5EF4-FFF2-40B4-BE49-F238E27FC236}">
                 <a16:creationId xmlns:a16="http://schemas.microsoft.com/office/drawing/2014/main" id="{2CBA79CF-1A03-8332-693B-C086F1A83055}"/>
@@ -14874,9 +14845,8 @@
               </a:ext>
             </a:extLst>
           </a:blip>
-          <a:stretch>
-            <a:fillRect/>
-          </a:stretch>
+          <a:srcRect/>
+          <a:stretch/>
         </p:blipFill>
         <p:spPr>
           <a:xfrm>
@@ -22483,7 +22453,7 @@
       </p:sp>
       <p:pic>
         <p:nvPicPr>
-          <p:cNvPr id="4" name="Content Placeholder 3" descr="A screenshot of a computer&#10;&#10;AI-generated content may be incorrect.">
+          <p:cNvPr id="4" name="Content Placeholder 3">
             <a:extLst>
               <a:ext uri="{FF2B5EF4-FFF2-40B4-BE49-F238E27FC236}">
                 <a16:creationId xmlns:a16="http://schemas.microsoft.com/office/drawing/2014/main" id="{5A0CAB7C-EC1A-FB2F-31A2-DDD832ACD4DC}"/>
@@ -22498,10 +22468,15 @@
           </p:nvPr>
         </p:nvPicPr>
         <p:blipFill>
-          <a:blip r:embed="rId5"/>
-          <a:stretch>
-            <a:fillRect/>
-          </a:stretch>
+          <a:blip r:embed="rId5">
+            <a:extLst>
+              <a:ext uri="{28A0092B-C50C-407E-A947-70E740481C1C}">
+                <a14:useLocalDpi xmlns:a14="http://schemas.microsoft.com/office/drawing/2010/main" val="0"/>
+              </a:ext>
+            </a:extLst>
+          </a:blip>
+          <a:srcRect/>
+          <a:stretch/>
         </p:blipFill>
         <p:spPr>
           <a:xfrm>

</xml_diff>